<commit_message>
netty 설명에 lettuce 언급
</commit_message>
<xml_diff>
--- a/99.ppt/[Ch4-3. 비동기 서비스 구현 (Spring Webflux)].pptx
+++ b/99.ppt/[Ch4-3. 비동기 서비스 구현 (Spring Webflux)].pptx
@@ -221,7 +221,7 @@
           <a:p>
             <a:fld id="{9B770909-2C76-4DF9-BB76-4EE283593418}" type="datetimeFigureOut">
               <a:rPr lang="ko-KR" altLang="en-US" smtClean="0"/>
-              <a:t>2023-08-01</a:t>
+              <a:t>2023-08-03</a:t>
             </a:fld>
             <a:endParaRPr lang="ko-KR" altLang="en-US"/>
           </a:p>
@@ -1589,16 +1589,6 @@
               <a:t>.</a:t>
             </a:r>
           </a:p>
-          <a:p>
-            <a:endParaRPr lang="en-US" altLang="ko-KR" dirty="0"/>
-          </a:p>
-          <a:p>
-            <a:pPr marL="0" indent="0">
-              <a:buFont typeface="Arial" panose="020B0604020202020204" pitchFamily="34" charset="0"/>
-              <a:buNone/>
-            </a:pPr>
-            <a:endParaRPr lang="en-US" altLang="ko-KR" dirty="0"/>
-          </a:p>
         </p:txBody>
       </p:sp>
       <p:sp>
@@ -1827,6 +1817,51 @@
               <a:rPr lang="en-US" altLang="ko-KR" dirty="0"/>
               <a:t>.</a:t>
             </a:r>
+          </a:p>
+          <a:p>
+            <a:endParaRPr lang="en-US" altLang="ko-KR" dirty="0"/>
+          </a:p>
+          <a:p>
+            <a:pPr marL="0" marR="0" lvl="0" indent="0" algn="l" defTabSz="685800" rtl="0" eaLnBrk="1" fontAlgn="auto" latinLnBrk="1" hangingPunct="1">
+              <a:lnSpc>
+                <a:spcPct val="100000"/>
+              </a:lnSpc>
+              <a:spcBef>
+                <a:spcPts val="0"/>
+              </a:spcBef>
+              <a:spcAft>
+                <a:spcPts val="0"/>
+              </a:spcAft>
+              <a:buClrTx/>
+              <a:buSzTx/>
+              <a:buFontTx/>
+              <a:buNone/>
+              <a:tabLst/>
+              <a:defRPr/>
+            </a:pPr>
+            <a:r>
+              <a:rPr lang="en-US" altLang="ko-KR" dirty="0"/>
+              <a:t>Redis Lettuce client </a:t>
+            </a:r>
+            <a:r>
+              <a:rPr lang="ko-KR" altLang="en-US" dirty="0"/>
+              <a:t>도 </a:t>
+            </a:r>
+            <a:r>
+              <a:rPr lang="en-US" altLang="ko-KR" dirty="0" err="1"/>
+              <a:t>Netty</a:t>
+            </a:r>
+            <a:r>
+              <a:rPr lang="ko-KR" altLang="en-US" dirty="0"/>
+              <a:t> 를 이용해 만들어졌습니다</a:t>
+            </a:r>
+            <a:r>
+              <a:rPr lang="en-US" altLang="ko-KR"/>
+              <a:t>.</a:t>
+            </a:r>
+          </a:p>
+          <a:p>
+            <a:endParaRPr lang="en-US" altLang="ko-KR" dirty="0"/>
           </a:p>
         </p:txBody>
       </p:sp>

</xml_diff>

<commit_message>
강의내용 작성 (reactor, coroutine)
</commit_message>
<xml_diff>
--- a/99.ppt/[Ch4-3. 비동기 서비스 구현 (Spring Webflux)].pptx
+++ b/99.ppt/[Ch4-3. 비동기 서비스 구현 (Spring Webflux)].pptx
@@ -5,23 +5,24 @@
     <p:sldMasterId id="2147483665" r:id="rId1"/>
   </p:sldMasterIdLst>
   <p:notesMasterIdLst>
-    <p:notesMasterId r:id="rId16"/>
+    <p:notesMasterId r:id="rId17"/>
   </p:notesMasterIdLst>
   <p:sldIdLst>
     <p:sldId id="256" r:id="rId2"/>
     <p:sldId id="258" r:id="rId3"/>
     <p:sldId id="270" r:id="rId4"/>
-    <p:sldId id="274" r:id="rId5"/>
-    <p:sldId id="271" r:id="rId6"/>
-    <p:sldId id="275" r:id="rId7"/>
-    <p:sldId id="272" r:id="rId8"/>
-    <p:sldId id="273" r:id="rId9"/>
-    <p:sldId id="262" r:id="rId10"/>
-    <p:sldId id="264" r:id="rId11"/>
-    <p:sldId id="265" r:id="rId12"/>
-    <p:sldId id="267" r:id="rId13"/>
-    <p:sldId id="268" r:id="rId14"/>
-    <p:sldId id="269" r:id="rId15"/>
+    <p:sldId id="276" r:id="rId5"/>
+    <p:sldId id="274" r:id="rId6"/>
+    <p:sldId id="271" r:id="rId7"/>
+    <p:sldId id="275" r:id="rId8"/>
+    <p:sldId id="272" r:id="rId9"/>
+    <p:sldId id="273" r:id="rId10"/>
+    <p:sldId id="262" r:id="rId11"/>
+    <p:sldId id="264" r:id="rId12"/>
+    <p:sldId id="265" r:id="rId13"/>
+    <p:sldId id="267" r:id="rId14"/>
+    <p:sldId id="268" r:id="rId15"/>
+    <p:sldId id="269" r:id="rId16"/>
   </p:sldIdLst>
   <p:sldSz cx="9144000" cy="5143500" type="screen16x9"/>
   <p:notesSz cx="6858000" cy="9144000"/>
@@ -221,7 +222,7 @@
           <a:p>
             <a:fld id="{9B770909-2C76-4DF9-BB76-4EE283593418}" type="datetimeFigureOut">
               <a:rPr lang="ko-KR" altLang="en-US" smtClean="0"/>
-              <a:t>2023-08-03</a:t>
+              <a:t>2023-08-09</a:t>
             </a:fld>
             <a:endParaRPr lang="ko-KR" altLang="en-US"/>
           </a:p>
@@ -690,32 +691,56 @@
           <a:p>
             <a:r>
               <a:rPr lang="ko-KR" altLang="en-US" dirty="0"/>
-              <a:t>프로젝트 환경 구성해 </a:t>
-            </a:r>
-            <a:r>
-              <a:rPr lang="ko-KR" altLang="en-US" dirty="0" err="1"/>
-              <a:t>보실께요</a:t>
+              <a:t>다시 </a:t>
+            </a:r>
+            <a:r>
+              <a:rPr lang="en-US" altLang="ko-KR" dirty="0"/>
+              <a:t>API </a:t>
+            </a:r>
+            <a:r>
+              <a:rPr lang="ko-KR" altLang="en-US" dirty="0"/>
+              <a:t>구현으로 돌아와서</a:t>
+            </a:r>
+            <a:r>
+              <a:rPr lang="en-US" altLang="ko-KR" dirty="0"/>
+              <a:t>…</a:t>
+            </a:r>
+          </a:p>
+          <a:p>
+            <a:endParaRPr lang="en-US" altLang="ko-KR" dirty="0"/>
+          </a:p>
+          <a:p>
+            <a:r>
+              <a:rPr lang="en-US" altLang="ko-KR" dirty="0" err="1"/>
+              <a:t>Webflux</a:t>
+            </a:r>
+            <a:r>
+              <a:rPr lang="en-US" altLang="ko-KR" dirty="0"/>
+              <a:t> Reactor </a:t>
+            </a:r>
+            <a:r>
+              <a:rPr lang="ko-KR" altLang="en-US" dirty="0"/>
+              <a:t>로</a:t>
+            </a:r>
+            <a:r>
+              <a:rPr lang="en-US" altLang="ko-KR" dirty="0"/>
+              <a:t> </a:t>
+            </a:r>
+            <a:r>
+              <a:rPr lang="ko-KR" altLang="en-US" dirty="0"/>
+              <a:t>구현해 볼 내용은 </a:t>
+            </a:r>
+            <a:r>
+              <a:rPr lang="en-US" altLang="ko-KR" dirty="0"/>
+              <a:t>Spring MVC</a:t>
+            </a:r>
+            <a:r>
+              <a:rPr lang="ko-KR" altLang="en-US" dirty="0"/>
+              <a:t>와 동일합니다</a:t>
             </a:r>
             <a:r>
               <a:rPr lang="en-US" altLang="ko-KR" dirty="0"/>
               <a:t>.</a:t>
-            </a:r>
-          </a:p>
-          <a:p>
-            <a:endParaRPr lang="en-US" altLang="ko-KR" dirty="0"/>
-          </a:p>
-          <a:p>
-            <a:r>
-              <a:rPr lang="en-US" altLang="ko-KR" dirty="0"/>
-              <a:t>&lt;&lt;</a:t>
-            </a:r>
-            <a:r>
-              <a:rPr lang="ko-KR" altLang="en-US" dirty="0"/>
-              <a:t>설명</a:t>
-            </a:r>
-            <a:r>
-              <a:rPr lang="en-US" altLang="ko-KR" dirty="0"/>
-              <a:t>&gt;&gt;</a:t>
             </a:r>
           </a:p>
         </p:txBody>
@@ -746,7 +771,7 @@
     </p:spTree>
     <p:extLst>
       <p:ext uri="{BB962C8B-B14F-4D97-AF65-F5344CB8AC3E}">
-        <p14:creationId xmlns:p14="http://schemas.microsoft.com/office/powerpoint/2010/main" val="3800460661"/>
+        <p14:creationId xmlns:p14="http://schemas.microsoft.com/office/powerpoint/2010/main" val="1978714165"/>
       </p:ext>
     </p:extLst>
   </p:cSld>
@@ -802,23 +827,32 @@
           <a:p>
             <a:r>
               <a:rPr lang="ko-KR" altLang="en-US" dirty="0"/>
-              <a:t>지금부터 </a:t>
+              <a:t>프로젝트 환경 구성해 </a:t>
+            </a:r>
+            <a:r>
+              <a:rPr lang="ko-KR" altLang="en-US" dirty="0" err="1"/>
+              <a:t>보실께요</a:t>
             </a:r>
             <a:r>
               <a:rPr lang="en-US" altLang="ko-KR" dirty="0"/>
-              <a:t>Spring </a:t>
-            </a:r>
-            <a:r>
-              <a:rPr lang="en-US" altLang="ko-KR" dirty="0" err="1"/>
-              <a:t>Webflux</a:t>
-            </a:r>
+              <a:t>.</a:t>
+            </a:r>
+          </a:p>
+          <a:p>
+            <a:endParaRPr lang="en-US" altLang="ko-KR" dirty="0"/>
+          </a:p>
+          <a:p>
             <a:r>
               <a:rPr lang="en-US" altLang="ko-KR" dirty="0"/>
-              <a:t> </a:t>
-            </a:r>
-            <a:r>
-              <a:rPr lang="ko-KR" altLang="en-US" dirty="0"/>
-              <a:t>를 이용해 비동기 서비스를 본격적으로 구현해 보겠습니다</a:t>
+              <a:t>&lt;&lt;</a:t>
+            </a:r>
+            <a:r>
+              <a:rPr lang="ko-KR" altLang="en-US" dirty="0"/>
+              <a:t>설명</a:t>
+            </a:r>
+            <a:r>
+              <a:rPr lang="en-US" altLang="ko-KR" dirty="0"/>
+              <a:t>&gt;&gt;</a:t>
             </a:r>
           </a:p>
         </p:txBody>
@@ -849,7 +883,7 @@
     </p:spTree>
     <p:extLst>
       <p:ext uri="{BB962C8B-B14F-4D97-AF65-F5344CB8AC3E}">
-        <p14:creationId xmlns:p14="http://schemas.microsoft.com/office/powerpoint/2010/main" val="2672002668"/>
+        <p14:creationId xmlns:p14="http://schemas.microsoft.com/office/powerpoint/2010/main" val="3800460661"/>
       </p:ext>
     </p:extLst>
   </p:cSld>
@@ -904,22 +938,25 @@
           <a:lstStyle/>
           <a:p>
             <a:r>
+              <a:rPr lang="ko-KR" altLang="en-US" dirty="0"/>
+              <a:t>지금부터 </a:t>
+            </a:r>
+            <a:r>
               <a:rPr lang="en-US" altLang="ko-KR" dirty="0"/>
-              <a:t>Hello world API</a:t>
-            </a:r>
-            <a:r>
-              <a:rPr lang="ko-KR" altLang="en-US"/>
-              <a:t>를 구현해 </a:t>
-            </a:r>
-            <a:r>
-              <a:rPr lang="ko-KR" altLang="en-US" dirty="0"/>
-              <a:t>보겠습니다</a:t>
+              <a:t>Spring </a:t>
+            </a:r>
+            <a:r>
+              <a:rPr lang="en-US" altLang="ko-KR" dirty="0" err="1"/>
+              <a:t>Webflux</a:t>
             </a:r>
             <a:r>
               <a:rPr lang="en-US" altLang="ko-KR" dirty="0"/>
-              <a:t>.</a:t>
-            </a:r>
-            <a:endParaRPr lang="ko-KR" altLang="en-US" dirty="0"/>
+              <a:t> </a:t>
+            </a:r>
+            <a:r>
+              <a:rPr lang="ko-KR" altLang="en-US" dirty="0"/>
+              <a:t>를 이용해 비동기 서비스를 본격적으로 구현해 보겠습니다</a:t>
+            </a:r>
           </a:p>
         </p:txBody>
       </p:sp>
@@ -949,7 +986,7 @@
     </p:spTree>
     <p:extLst>
       <p:ext uri="{BB962C8B-B14F-4D97-AF65-F5344CB8AC3E}">
-        <p14:creationId xmlns:p14="http://schemas.microsoft.com/office/powerpoint/2010/main" val="3842670641"/>
+        <p14:creationId xmlns:p14="http://schemas.microsoft.com/office/powerpoint/2010/main" val="2672002668"/>
       </p:ext>
     </p:extLst>
   </p:cSld>
@@ -1003,6 +1040,22 @@
           <a:bodyPr/>
           <a:lstStyle/>
           <a:p>
+            <a:r>
+              <a:rPr lang="en-US" altLang="ko-KR" dirty="0"/>
+              <a:t>Hello world API</a:t>
+            </a:r>
+            <a:r>
+              <a:rPr lang="ko-KR" altLang="en-US"/>
+              <a:t>를 구현해 </a:t>
+            </a:r>
+            <a:r>
+              <a:rPr lang="ko-KR" altLang="en-US" dirty="0"/>
+              <a:t>보겠습니다</a:t>
+            </a:r>
+            <a:r>
+              <a:rPr lang="en-US" altLang="ko-KR" dirty="0"/>
+              <a:t>.</a:t>
+            </a:r>
             <a:endParaRPr lang="ko-KR" altLang="en-US" dirty="0"/>
           </a:p>
         </p:txBody>
@@ -1024,7 +1077,91 @@
           <a:p>
             <a:fld id="{4F243B46-72FF-4656-838A-691B9EB329E3}" type="slidenum">
               <a:rPr lang="ko-KR" altLang="en-US" smtClean="0"/>
-              <a:t>14</a:t>
+              <a:t>13</a:t>
+            </a:fld>
+            <a:endParaRPr lang="ko-KR" altLang="en-US"/>
+          </a:p>
+        </p:txBody>
+      </p:sp>
+    </p:spTree>
+    <p:extLst>
+      <p:ext uri="{BB962C8B-B14F-4D97-AF65-F5344CB8AC3E}">
+        <p14:creationId xmlns:p14="http://schemas.microsoft.com/office/powerpoint/2010/main" val="3842670641"/>
+      </p:ext>
+    </p:extLst>
+  </p:cSld>
+  <p:clrMapOvr>
+    <a:masterClrMapping/>
+  </p:clrMapOvr>
+</p:notes>
+</file>
+
+<file path=ppt/notesSlides/notesSlide14.xml><?xml version="1.0" encoding="utf-8"?>
+<p:notes xmlns:a="http://schemas.openxmlformats.org/drawingml/2006/main" xmlns:r="http://schemas.openxmlformats.org/officeDocument/2006/relationships" xmlns:p="http://schemas.openxmlformats.org/presentationml/2006/main">
+  <p:cSld>
+    <p:spTree>
+      <p:nvGrpSpPr>
+        <p:cNvPr id="1" name=""/>
+        <p:cNvGrpSpPr/>
+        <p:nvPr/>
+      </p:nvGrpSpPr>
+      <p:grpSpPr>
+        <a:xfrm>
+          <a:off x="0" y="0"/>
+          <a:ext cx="0" cy="0"/>
+          <a:chOff x="0" y="0"/>
+          <a:chExt cx="0" cy="0"/>
+        </a:xfrm>
+      </p:grpSpPr>
+      <p:sp>
+        <p:nvSpPr>
+          <p:cNvPr id="2" name="슬라이드 이미지 개체 틀 1"/>
+          <p:cNvSpPr>
+            <a:spLocks noGrp="1" noRot="1" noChangeAspect="1"/>
+          </p:cNvSpPr>
+          <p:nvPr>
+            <p:ph type="sldImg"/>
+          </p:nvPr>
+        </p:nvSpPr>
+        <p:spPr/>
+      </p:sp>
+      <p:sp>
+        <p:nvSpPr>
+          <p:cNvPr id="3" name="슬라이드 노트 개체 틀 2"/>
+          <p:cNvSpPr>
+            <a:spLocks noGrp="1"/>
+          </p:cNvSpPr>
+          <p:nvPr>
+            <p:ph type="body" idx="1"/>
+          </p:nvPr>
+        </p:nvSpPr>
+        <p:spPr/>
+        <p:txBody>
+          <a:bodyPr/>
+          <a:lstStyle/>
+          <a:p>
+            <a:endParaRPr lang="ko-KR" altLang="en-US" dirty="0"/>
+          </a:p>
+        </p:txBody>
+      </p:sp>
+      <p:sp>
+        <p:nvSpPr>
+          <p:cNvPr id="4" name="슬라이드 번호 개체 틀 3"/>
+          <p:cNvSpPr>
+            <a:spLocks noGrp="1"/>
+          </p:cNvSpPr>
+          <p:nvPr>
+            <p:ph type="sldNum" sz="quarter" idx="5"/>
+          </p:nvPr>
+        </p:nvSpPr>
+        <p:spPr/>
+        <p:txBody>
+          <a:bodyPr/>
+          <a:lstStyle/>
+          <a:p>
+            <a:fld id="{4F243B46-72FF-4656-838A-691B9EB329E3}" type="slidenum">
+              <a:rPr lang="ko-KR" altLang="en-US" smtClean="0"/>
+              <a:t>15</a:t>
             </a:fld>
             <a:endParaRPr lang="ko-KR" altLang="en-US"/>
           </a:p>
@@ -1339,160 +1476,6 @@
           <a:bodyPr/>
           <a:lstStyle/>
           <a:p>
-            <a:r>
-              <a:rPr lang="ko-KR" altLang="en-US" dirty="0" err="1"/>
-              <a:t>이희승</a:t>
-            </a:r>
-            <a:r>
-              <a:rPr lang="ko-KR" altLang="en-US" dirty="0"/>
-              <a:t> 님</a:t>
-            </a:r>
-            <a:endParaRPr lang="en-US" altLang="ko-KR" dirty="0"/>
-          </a:p>
-          <a:p>
-            <a:pPr marL="171450" indent="-171450">
-              <a:buFont typeface="Arial" panose="020B0604020202020204" pitchFamily="34" charset="0"/>
-              <a:buChar char="•"/>
-            </a:pPr>
-            <a:r>
-              <a:rPr lang="ko-KR" altLang="en-US" dirty="0"/>
-              <a:t>가장 유명한 한국인 오픈소스 개발자</a:t>
-            </a:r>
-            <a:endParaRPr lang="en-US" altLang="ko-KR" dirty="0"/>
-          </a:p>
-          <a:p>
-            <a:pPr marL="171450" indent="-171450">
-              <a:buFont typeface="Arial" panose="020B0604020202020204" pitchFamily="34" charset="0"/>
-              <a:buChar char="•"/>
-            </a:pPr>
-            <a:r>
-              <a:rPr lang="en-US" altLang="ko-KR" dirty="0"/>
-              <a:t>Twitter, Line</a:t>
-            </a:r>
-          </a:p>
-          <a:p>
-            <a:pPr marL="171450" indent="-171450">
-              <a:buFont typeface="Arial" panose="020B0604020202020204" pitchFamily="34" charset="0"/>
-              <a:buChar char="•"/>
-            </a:pPr>
-            <a:r>
-              <a:rPr lang="ko-KR" altLang="en-US" dirty="0"/>
-              <a:t>현재 </a:t>
-            </a:r>
-            <a:r>
-              <a:rPr lang="en-US" altLang="ko-KR" dirty="0"/>
-              <a:t>Line</a:t>
-            </a:r>
-            <a:r>
-              <a:rPr lang="ko-KR" altLang="en-US" dirty="0"/>
-              <a:t>에서 </a:t>
-            </a:r>
-            <a:r>
-              <a:rPr lang="en-US" altLang="ko-KR" dirty="0" err="1"/>
-              <a:t>Armeria</a:t>
-            </a:r>
-            <a:r>
-              <a:rPr lang="ko-KR" altLang="en-US" dirty="0"/>
-              <a:t>라는 </a:t>
-            </a:r>
-            <a:r>
-              <a:rPr lang="en-US" altLang="ko-KR" dirty="0"/>
-              <a:t>Microservice framework </a:t>
-            </a:r>
-            <a:r>
-              <a:rPr lang="ko-KR" altLang="en-US" dirty="0" err="1"/>
-              <a:t>개발중</a:t>
-            </a:r>
-            <a:endParaRPr lang="en-US" altLang="ko-KR" dirty="0"/>
-          </a:p>
-          <a:p>
-            <a:pPr marL="171450" indent="-171450">
-              <a:buFont typeface="Arial" panose="020B0604020202020204" pitchFamily="34" charset="0"/>
-              <a:buChar char="•"/>
-            </a:pPr>
-            <a:r>
-              <a:rPr lang="ko-KR" altLang="en-US" dirty="0"/>
-              <a:t>희승사화</a:t>
-            </a:r>
-            <a:endParaRPr lang="en-US" altLang="ko-KR" dirty="0"/>
-          </a:p>
-          <a:p>
-            <a:pPr marL="514350" lvl="1" indent="-171450">
-              <a:buFont typeface="Arial" panose="020B0604020202020204" pitchFamily="34" charset="0"/>
-              <a:buChar char="•"/>
-            </a:pPr>
-            <a:r>
-              <a:rPr lang="en-US" altLang="ko-KR" dirty="0"/>
-              <a:t>2004</a:t>
-            </a:r>
-            <a:r>
-              <a:rPr lang="ko-KR" altLang="en-US" dirty="0"/>
-              <a:t>년 자바서비스넷</a:t>
-            </a:r>
-            <a:endParaRPr lang="en-US" altLang="ko-KR" dirty="0"/>
-          </a:p>
-          <a:p>
-            <a:pPr marL="514350" lvl="1" indent="-171450">
-              <a:buFont typeface="Arial" panose="020B0604020202020204" pitchFamily="34" charset="0"/>
-              <a:buChar char="•"/>
-            </a:pPr>
-            <a:r>
-              <a:rPr lang="en-US" altLang="ko-KR" dirty="0"/>
-              <a:t>25</a:t>
-            </a:r>
-            <a:r>
-              <a:rPr lang="ko-KR" altLang="en-US" dirty="0"/>
-              <a:t>세 개발자</a:t>
-            </a:r>
-            <a:endParaRPr lang="en-US" altLang="ko-KR" dirty="0"/>
-          </a:p>
-          <a:p>
-            <a:pPr marL="514350" lvl="1" indent="-171450">
-              <a:buFont typeface="Arial" panose="020B0604020202020204" pitchFamily="34" charset="0"/>
-              <a:buChar char="•"/>
-            </a:pPr>
-            <a:r>
-              <a:rPr lang="ko-KR" altLang="en-US" dirty="0"/>
-              <a:t>대리 </a:t>
-            </a:r>
-            <a:r>
-              <a:rPr lang="en-US" altLang="ko-KR" dirty="0"/>
-              <a:t>-&gt; </a:t>
-            </a:r>
-            <a:r>
-              <a:rPr lang="ko-KR" altLang="en-US" dirty="0"/>
-              <a:t>과장 </a:t>
-            </a:r>
-            <a:r>
-              <a:rPr lang="en-US" altLang="ko-KR" dirty="0"/>
-              <a:t>-&gt; PM </a:t>
-            </a:r>
-            <a:r>
-              <a:rPr lang="ko-KR" altLang="en-US" dirty="0"/>
-              <a:t>진급까지 해봤음</a:t>
-            </a:r>
-            <a:endParaRPr lang="en-US" altLang="ko-KR" dirty="0"/>
-          </a:p>
-          <a:p>
-            <a:pPr marL="514350" lvl="1" indent="-171450">
-              <a:buFont typeface="Arial" panose="020B0604020202020204" pitchFamily="34" charset="0"/>
-              <a:buChar char="•"/>
-            </a:pPr>
-            <a:r>
-              <a:rPr lang="ko-KR" altLang="en-US" dirty="0"/>
-              <a:t>뜻하는 바가 있어 대학원에 진학하고 싶은데</a:t>
-            </a:r>
-            <a:r>
-              <a:rPr lang="en-US" altLang="ko-KR" dirty="0"/>
-              <a:t>, </a:t>
-            </a:r>
-            <a:r>
-              <a:rPr lang="ko-KR" altLang="en-US" dirty="0"/>
-              <a:t>회사에서 이사 직함과 함께 고액 연봉을 제시</a:t>
-            </a:r>
-            <a:endParaRPr lang="en-US" altLang="ko-KR" dirty="0"/>
-          </a:p>
-          <a:p>
             <a:endParaRPr lang="en-US" altLang="ko-KR" dirty="0"/>
           </a:p>
         </p:txBody>
@@ -1523,7 +1506,7 @@
     </p:spTree>
     <p:extLst>
       <p:ext uri="{BB962C8B-B14F-4D97-AF65-F5344CB8AC3E}">
-        <p14:creationId xmlns:p14="http://schemas.microsoft.com/office/powerpoint/2010/main" val="3341541337"/>
+        <p14:creationId xmlns:p14="http://schemas.microsoft.com/office/powerpoint/2010/main" val="2264410187"/>
       </p:ext>
     </p:extLst>
   </p:cSld>
@@ -1577,17 +1560,161 @@
           <a:bodyPr/>
           <a:lstStyle/>
           <a:p>
+            <a:r>
+              <a:rPr lang="ko-KR" altLang="en-US" dirty="0" err="1"/>
+              <a:t>이희승</a:t>
+            </a:r>
+            <a:r>
+              <a:rPr lang="ko-KR" altLang="en-US" dirty="0"/>
+              <a:t> 님</a:t>
+            </a:r>
             <a:endParaRPr lang="en-US" altLang="ko-KR" dirty="0"/>
           </a:p>
           <a:p>
-            <a:r>
-              <a:rPr lang="ko-KR" altLang="en-US" dirty="0"/>
-              <a:t>고성능 프로토콜 서버와 클라이언트를 빠르게 개발할 수 있습니다</a:t>
-            </a:r>
+            <a:pPr marL="171450" indent="-171450">
+              <a:buFont typeface="Arial" panose="020B0604020202020204" pitchFamily="34" charset="0"/>
+              <a:buChar char="•"/>
+            </a:pPr>
+            <a:r>
+              <a:rPr lang="ko-KR" altLang="en-US" dirty="0"/>
+              <a:t>가장 유명한 한국인 오픈소스 개발자</a:t>
+            </a:r>
+            <a:endParaRPr lang="en-US" altLang="ko-KR" dirty="0"/>
+          </a:p>
+          <a:p>
+            <a:pPr marL="171450" indent="-171450">
+              <a:buFont typeface="Arial" panose="020B0604020202020204" pitchFamily="34" charset="0"/>
+              <a:buChar char="•"/>
+            </a:pPr>
             <a:r>
               <a:rPr lang="en-US" altLang="ko-KR" dirty="0"/>
-              <a:t>.</a:t>
-            </a:r>
+              <a:t>Twitter, Line</a:t>
+            </a:r>
+          </a:p>
+          <a:p>
+            <a:pPr marL="171450" indent="-171450">
+              <a:buFont typeface="Arial" panose="020B0604020202020204" pitchFamily="34" charset="0"/>
+              <a:buChar char="•"/>
+            </a:pPr>
+            <a:r>
+              <a:rPr lang="ko-KR" altLang="en-US" dirty="0"/>
+              <a:t>현재 </a:t>
+            </a:r>
+            <a:r>
+              <a:rPr lang="en-US" altLang="ko-KR" dirty="0"/>
+              <a:t>Line</a:t>
+            </a:r>
+            <a:r>
+              <a:rPr lang="ko-KR" altLang="en-US" dirty="0"/>
+              <a:t>에서 </a:t>
+            </a:r>
+            <a:r>
+              <a:rPr lang="en-US" altLang="ko-KR" dirty="0" err="1"/>
+              <a:t>Armeria</a:t>
+            </a:r>
+            <a:r>
+              <a:rPr lang="ko-KR" altLang="en-US" dirty="0"/>
+              <a:t>라는 </a:t>
+            </a:r>
+            <a:r>
+              <a:rPr lang="en-US" altLang="ko-KR" dirty="0"/>
+              <a:t>Microservice framework </a:t>
+            </a:r>
+            <a:r>
+              <a:rPr lang="ko-KR" altLang="en-US" dirty="0" err="1"/>
+              <a:t>개발중</a:t>
+            </a:r>
+            <a:endParaRPr lang="en-US" altLang="ko-KR" dirty="0"/>
+          </a:p>
+          <a:p>
+            <a:pPr marL="171450" indent="-171450">
+              <a:buFont typeface="Arial" panose="020B0604020202020204" pitchFamily="34" charset="0"/>
+              <a:buChar char="•"/>
+            </a:pPr>
+            <a:r>
+              <a:rPr lang="ko-KR" altLang="en-US" dirty="0"/>
+              <a:t>희승사화</a:t>
+            </a:r>
+            <a:endParaRPr lang="en-US" altLang="ko-KR" dirty="0"/>
+          </a:p>
+          <a:p>
+            <a:pPr marL="514350" lvl="1" indent="-171450">
+              <a:buFont typeface="Arial" panose="020B0604020202020204" pitchFamily="34" charset="0"/>
+              <a:buChar char="•"/>
+            </a:pPr>
+            <a:r>
+              <a:rPr lang="en-US" altLang="ko-KR" dirty="0"/>
+              <a:t>2004</a:t>
+            </a:r>
+            <a:r>
+              <a:rPr lang="ko-KR" altLang="en-US" dirty="0"/>
+              <a:t>년 자바서비스넷</a:t>
+            </a:r>
+            <a:endParaRPr lang="en-US" altLang="ko-KR" dirty="0"/>
+          </a:p>
+          <a:p>
+            <a:pPr marL="514350" lvl="1" indent="-171450">
+              <a:buFont typeface="Arial" panose="020B0604020202020204" pitchFamily="34" charset="0"/>
+              <a:buChar char="•"/>
+            </a:pPr>
+            <a:r>
+              <a:rPr lang="en-US" altLang="ko-KR" dirty="0"/>
+              <a:t>25</a:t>
+            </a:r>
+            <a:r>
+              <a:rPr lang="ko-KR" altLang="en-US" dirty="0"/>
+              <a:t>세 개발자</a:t>
+            </a:r>
+            <a:endParaRPr lang="en-US" altLang="ko-KR" dirty="0"/>
+          </a:p>
+          <a:p>
+            <a:pPr marL="514350" lvl="1" indent="-171450">
+              <a:buFont typeface="Arial" panose="020B0604020202020204" pitchFamily="34" charset="0"/>
+              <a:buChar char="•"/>
+            </a:pPr>
+            <a:r>
+              <a:rPr lang="ko-KR" altLang="en-US" dirty="0"/>
+              <a:t>대리 </a:t>
+            </a:r>
+            <a:r>
+              <a:rPr lang="en-US" altLang="ko-KR" dirty="0"/>
+              <a:t>-&gt; </a:t>
+            </a:r>
+            <a:r>
+              <a:rPr lang="ko-KR" altLang="en-US" dirty="0"/>
+              <a:t>과장 </a:t>
+            </a:r>
+            <a:r>
+              <a:rPr lang="en-US" altLang="ko-KR" dirty="0"/>
+              <a:t>-&gt; PM </a:t>
+            </a:r>
+            <a:r>
+              <a:rPr lang="ko-KR" altLang="en-US" dirty="0"/>
+              <a:t>진급까지 해봤음</a:t>
+            </a:r>
+            <a:endParaRPr lang="en-US" altLang="ko-KR" dirty="0"/>
+          </a:p>
+          <a:p>
+            <a:pPr marL="514350" lvl="1" indent="-171450">
+              <a:buFont typeface="Arial" panose="020B0604020202020204" pitchFamily="34" charset="0"/>
+              <a:buChar char="•"/>
+            </a:pPr>
+            <a:r>
+              <a:rPr lang="ko-KR" altLang="en-US" dirty="0"/>
+              <a:t>뜻하는 바가 있어 대학원에 진학하고 싶은데</a:t>
+            </a:r>
+            <a:r>
+              <a:rPr lang="en-US" altLang="ko-KR" dirty="0"/>
+              <a:t>, </a:t>
+            </a:r>
+            <a:r>
+              <a:rPr lang="ko-KR" altLang="en-US" dirty="0"/>
+              <a:t>회사에서 이사 직함과 함께 고액 연봉을 제시</a:t>
+            </a:r>
+            <a:endParaRPr lang="en-US" altLang="ko-KR" dirty="0"/>
+          </a:p>
+          <a:p>
+            <a:endParaRPr lang="en-US" altLang="ko-KR" dirty="0"/>
           </a:p>
         </p:txBody>
       </p:sp>
@@ -1617,7 +1744,7 @@
     </p:spTree>
     <p:extLst>
       <p:ext uri="{BB962C8B-B14F-4D97-AF65-F5344CB8AC3E}">
-        <p14:creationId xmlns:p14="http://schemas.microsoft.com/office/powerpoint/2010/main" val="543300377"/>
+        <p14:creationId xmlns:p14="http://schemas.microsoft.com/office/powerpoint/2010/main" val="3341541337"/>
       </p:ext>
     </p:extLst>
   </p:cSld>
@@ -1671,196 +1798,6 @@
           <a:bodyPr/>
           <a:lstStyle/>
           <a:p>
-            <a:r>
-              <a:rPr lang="en-US" altLang="ko-KR" dirty="0"/>
-              <a:t>Socket </a:t>
-            </a:r>
-            <a:r>
-              <a:rPr lang="ko-KR" altLang="en-US" dirty="0"/>
-              <a:t>을 통해 서버와 </a:t>
-            </a:r>
-            <a:r>
-              <a:rPr lang="en-US" altLang="ko-KR" dirty="0"/>
-              <a:t>client </a:t>
-            </a:r>
-            <a:r>
-              <a:rPr lang="ko-KR" altLang="en-US" dirty="0"/>
-              <a:t>가 통신하기 위해서는 </a:t>
-            </a:r>
-            <a:r>
-              <a:rPr lang="en-US" altLang="ko-KR" dirty="0"/>
-              <a:t>thread </a:t>
-            </a:r>
-            <a:r>
-              <a:rPr lang="ko-KR" altLang="en-US" dirty="0"/>
-              <a:t>가 하나씩 필요했는데</a:t>
-            </a:r>
-            <a:endParaRPr lang="en-US" altLang="ko-KR" dirty="0"/>
-          </a:p>
-          <a:p>
-            <a:r>
-              <a:rPr lang="en-US" altLang="ko-KR" dirty="0" err="1"/>
-              <a:t>Netty</a:t>
-            </a:r>
-            <a:r>
-              <a:rPr lang="en-US" altLang="ko-KR" dirty="0"/>
-              <a:t> </a:t>
-            </a:r>
-            <a:r>
-              <a:rPr lang="ko-KR" altLang="en-US" dirty="0"/>
-              <a:t>는 이벤트 루프 기반으로 움직이기 때문에 적은 쓰레드로 고속의 </a:t>
-            </a:r>
-            <a:r>
-              <a:rPr lang="en-US" altLang="ko-KR" dirty="0"/>
-              <a:t>socket </a:t>
-            </a:r>
-            <a:r>
-              <a:rPr lang="ko-KR" altLang="en-US" dirty="0"/>
-              <a:t>통신을 가능케 했다는 점이죠</a:t>
-            </a:r>
-            <a:r>
-              <a:rPr lang="en-US" altLang="ko-KR" dirty="0"/>
-              <a:t>.</a:t>
-            </a:r>
-          </a:p>
-          <a:p>
-            <a:endParaRPr lang="en-US" altLang="ko-KR" dirty="0"/>
-          </a:p>
-          <a:p>
-            <a:r>
-              <a:rPr lang="en-US" altLang="ko-KR" dirty="0" err="1"/>
-              <a:t>Netty</a:t>
-            </a:r>
-            <a:r>
-              <a:rPr lang="ko-KR" altLang="en-US" dirty="0"/>
-              <a:t> 주요 개념</a:t>
-            </a:r>
-            <a:endParaRPr lang="en-US" altLang="ko-KR" dirty="0"/>
-          </a:p>
-          <a:p>
-            <a:pPr marL="171450" indent="-171450">
-              <a:buFont typeface="Arial" panose="020B0604020202020204" pitchFamily="34" charset="0"/>
-              <a:buChar char="•"/>
-            </a:pPr>
-            <a:r>
-              <a:rPr lang="en-US" altLang="ko-KR" dirty="0"/>
-              <a:t>Channel</a:t>
-            </a:r>
-          </a:p>
-          <a:p>
-            <a:pPr marL="171450" indent="-171450">
-              <a:buFont typeface="Arial" panose="020B0604020202020204" pitchFamily="34" charset="0"/>
-              <a:buChar char="•"/>
-            </a:pPr>
-            <a:r>
-              <a:rPr lang="en-US" altLang="ko-KR" dirty="0"/>
-              <a:t>Channel pipeline</a:t>
-            </a:r>
-          </a:p>
-          <a:p>
-            <a:pPr marL="171450" indent="-171450">
-              <a:buFont typeface="Arial" panose="020B0604020202020204" pitchFamily="34" charset="0"/>
-              <a:buChar char="•"/>
-            </a:pPr>
-            <a:r>
-              <a:rPr lang="en-US" altLang="ko-KR" dirty="0"/>
-              <a:t>Handler</a:t>
-            </a:r>
-          </a:p>
-          <a:p>
-            <a:pPr marL="171450" indent="-171450">
-              <a:buFont typeface="Arial" panose="020B0604020202020204" pitchFamily="34" charset="0"/>
-              <a:buChar char="•"/>
-            </a:pPr>
-            <a:r>
-              <a:rPr lang="en-US" altLang="ko-KR" dirty="0"/>
-              <a:t>Channel Buffer</a:t>
-            </a:r>
-          </a:p>
-          <a:p>
-            <a:pPr marL="171450" indent="-171450">
-              <a:buFont typeface="Arial" panose="020B0604020202020204" pitchFamily="34" charset="0"/>
-              <a:buChar char="•"/>
-            </a:pPr>
-            <a:r>
-              <a:rPr lang="en-US" altLang="ko-KR" dirty="0"/>
-              <a:t>Decoder / Encoder</a:t>
-            </a:r>
-          </a:p>
-          <a:p>
-            <a:pPr marL="171450" indent="-171450">
-              <a:buFont typeface="Arial" panose="020B0604020202020204" pitchFamily="34" charset="0"/>
-              <a:buChar char="•"/>
-            </a:pPr>
-            <a:r>
-              <a:rPr lang="en-US" altLang="ko-KR" dirty="0"/>
-              <a:t>Frame</a:t>
-            </a:r>
-          </a:p>
-          <a:p>
-            <a:endParaRPr lang="en-US" altLang="ko-KR" dirty="0"/>
-          </a:p>
-          <a:p>
-            <a:r>
-              <a:rPr lang="ko-KR" altLang="en-US" dirty="0"/>
-              <a:t>꼭 서버 개발에만 사용되는 것은 아니니</a:t>
-            </a:r>
-            <a:r>
-              <a:rPr lang="en-US" altLang="ko-KR" dirty="0"/>
-              <a:t>, </a:t>
-            </a:r>
-            <a:r>
-              <a:rPr lang="ko-KR" altLang="en-US" dirty="0"/>
-              <a:t>나중에 필요해 질 때 살펴보시면 되겠습니다</a:t>
-            </a:r>
-            <a:r>
-              <a:rPr lang="en-US" altLang="ko-KR" dirty="0"/>
-              <a:t>.</a:t>
-            </a:r>
-          </a:p>
-          <a:p>
-            <a:endParaRPr lang="en-US" altLang="ko-KR" dirty="0"/>
-          </a:p>
-          <a:p>
-            <a:pPr marL="0" marR="0" lvl="0" indent="0" algn="l" defTabSz="685800" rtl="0" eaLnBrk="1" fontAlgn="auto" latinLnBrk="1" hangingPunct="1">
-              <a:lnSpc>
-                <a:spcPct val="100000"/>
-              </a:lnSpc>
-              <a:spcBef>
-                <a:spcPts val="0"/>
-              </a:spcBef>
-              <a:spcAft>
-                <a:spcPts val="0"/>
-              </a:spcAft>
-              <a:buClrTx/>
-              <a:buSzTx/>
-              <a:buFontTx/>
-              <a:buNone/>
-              <a:tabLst/>
-              <a:defRPr/>
-            </a:pPr>
-            <a:r>
-              <a:rPr lang="en-US" altLang="ko-KR" dirty="0"/>
-              <a:t>Redis Lettuce client </a:t>
-            </a:r>
-            <a:r>
-              <a:rPr lang="ko-KR" altLang="en-US" dirty="0"/>
-              <a:t>도 </a:t>
-            </a:r>
-            <a:r>
-              <a:rPr lang="en-US" altLang="ko-KR" dirty="0" err="1"/>
-              <a:t>Netty</a:t>
-            </a:r>
-            <a:r>
-              <a:rPr lang="ko-KR" altLang="en-US" dirty="0"/>
-              <a:t> 를 이용해 만들어졌습니다</a:t>
-            </a:r>
-            <a:r>
-              <a:rPr lang="en-US" altLang="ko-KR"/>
-              <a:t>.</a:t>
-            </a:r>
-          </a:p>
-          <a:p>
             <a:endParaRPr lang="en-US" altLang="ko-KR" dirty="0"/>
           </a:p>
         </p:txBody>
@@ -1891,7 +1828,7 @@
     </p:spTree>
     <p:extLst>
       <p:ext uri="{BB962C8B-B14F-4D97-AF65-F5344CB8AC3E}">
-        <p14:creationId xmlns:p14="http://schemas.microsoft.com/office/powerpoint/2010/main" val="1260209787"/>
+        <p14:creationId xmlns:p14="http://schemas.microsoft.com/office/powerpoint/2010/main" val="543300377"/>
       </p:ext>
     </p:extLst>
   </p:cSld>
@@ -1947,31 +1884,54 @@
           <a:p>
             <a:r>
               <a:rPr lang="ko-KR" altLang="en-US" dirty="0"/>
-              <a:t>다음으로 </a:t>
+              <a:t>과거 </a:t>
             </a:r>
             <a:r>
               <a:rPr lang="en-US" altLang="ko-KR" dirty="0"/>
-              <a:t>Spring </a:t>
-            </a:r>
+              <a:t>Socket </a:t>
+            </a:r>
+            <a:r>
+              <a:rPr lang="ko-KR" altLang="en-US" dirty="0"/>
+              <a:t>을 통해 서버와 </a:t>
+            </a:r>
+            <a:r>
+              <a:rPr lang="en-US" altLang="ko-KR" dirty="0"/>
+              <a:t>client </a:t>
+            </a:r>
+            <a:r>
+              <a:rPr lang="ko-KR" altLang="en-US" dirty="0"/>
+              <a:t>가 통신하기 위해서는 </a:t>
+            </a:r>
+            <a:r>
+              <a:rPr lang="en-US" altLang="ko-KR" dirty="0"/>
+              <a:t>thread </a:t>
+            </a:r>
+            <a:r>
+              <a:rPr lang="ko-KR" altLang="en-US" dirty="0"/>
+              <a:t>가 하나씩 필요했는데</a:t>
+            </a:r>
+            <a:endParaRPr lang="en-US" altLang="ko-KR" dirty="0"/>
+          </a:p>
+          <a:p>
             <a:r>
               <a:rPr lang="en-US" altLang="ko-KR" dirty="0" err="1"/>
-              <a:t>Webflux</a:t>
+              <a:t>Netty</a:t>
             </a:r>
             <a:r>
               <a:rPr lang="en-US" altLang="ko-KR" dirty="0"/>
-              <a:t> stack </a:t>
-            </a:r>
-            <a:r>
-              <a:rPr lang="ko-KR" altLang="en-US" dirty="0"/>
-              <a:t>에서 비즈니스 로직을 구현하기 위한 </a:t>
+              <a:t> </a:t>
+            </a:r>
+            <a:r>
+              <a:rPr lang="ko-KR" altLang="en-US" dirty="0"/>
+              <a:t>는 이벤트 루프 기반으로 움직이기 때문에 적은 쓰레드로 고속의 </a:t>
             </a:r>
             <a:r>
               <a:rPr lang="en-US" altLang="ko-KR" dirty="0"/>
-              <a:t>Reactor</a:t>
-            </a:r>
-            <a:r>
-              <a:rPr lang="ko-KR" altLang="en-US" dirty="0"/>
-              <a:t> 란 라이브러리 살펴보겠습니다</a:t>
+              <a:t>socket </a:t>
+            </a:r>
+            <a:r>
+              <a:rPr lang="ko-KR" altLang="en-US" dirty="0"/>
+              <a:t>통신을 가능케 했습니다</a:t>
             </a:r>
             <a:r>
               <a:rPr lang="en-US" altLang="ko-KR" dirty="0"/>
@@ -1983,102 +1943,29 @@
           </a:p>
           <a:p>
             <a:r>
+              <a:rPr lang="ko-KR" altLang="en-US" dirty="0"/>
+              <a:t>꼭 서버 개발에만 사용되는 것은 아니며</a:t>
+            </a:r>
+            <a:r>
               <a:rPr lang="en-US" altLang="ko-KR" dirty="0"/>
-              <a:t>&lt;&lt;</a:t>
-            </a:r>
-            <a:r>
-              <a:rPr lang="ko-KR" altLang="en-US" dirty="0"/>
-              <a:t>설명</a:t>
-            </a:r>
-            <a:r>
-              <a:rPr lang="en-US" altLang="ko-KR" dirty="0"/>
-              <a:t>&gt;&gt;</a:t>
-            </a:r>
-          </a:p>
-          <a:p>
-            <a:endParaRPr lang="en-US" altLang="ko-KR" dirty="0"/>
-          </a:p>
-          <a:p>
-            <a:r>
-              <a:rPr lang="ko-KR" altLang="en-US" dirty="0"/>
-              <a:t>당시 </a:t>
-            </a:r>
-            <a:r>
-              <a:rPr lang="en-US" altLang="ko-KR" dirty="0"/>
-              <a:t>Netflix </a:t>
-            </a:r>
-            <a:r>
-              <a:rPr lang="ko-KR" altLang="en-US" dirty="0"/>
-              <a:t>에서도 </a:t>
-            </a:r>
-            <a:r>
-              <a:rPr lang="en-US" altLang="ko-KR" dirty="0"/>
-              <a:t>Microservice </a:t>
-            </a:r>
-            <a:r>
-              <a:rPr lang="ko-KR" altLang="en-US" dirty="0"/>
-              <a:t>간 부하 전파에 대해 비슷한 고민을 하고 있었으며</a:t>
-            </a:r>
-            <a:r>
-              <a:rPr lang="en-US" altLang="ko-KR" dirty="0"/>
-              <a:t>, </a:t>
-            </a:r>
-            <a:r>
-              <a:rPr lang="ko-KR" altLang="en-US" dirty="0"/>
-              <a:t>이를 해결하기 위해 </a:t>
+              <a:t>, Redis Lettuce client </a:t>
+            </a:r>
+            <a:r>
+              <a:rPr lang="ko-KR" altLang="en-US" dirty="0"/>
+              <a:t>도 </a:t>
             </a:r>
             <a:r>
               <a:rPr lang="en-US" altLang="ko-KR" dirty="0" err="1"/>
-              <a:t>RxJava</a:t>
-            </a:r>
-            <a:r>
-              <a:rPr lang="ko-KR" altLang="en-US" dirty="0"/>
-              <a:t>란 비동기 </a:t>
-            </a:r>
-            <a:r>
-              <a:rPr lang="en-US" altLang="ko-KR" dirty="0"/>
-              <a:t>NIO </a:t>
-            </a:r>
-            <a:r>
-              <a:rPr lang="ko-KR" altLang="en-US" dirty="0"/>
-              <a:t>프레임워크를 만들었는데</a:t>
-            </a:r>
-            <a:endParaRPr lang="en-US" altLang="ko-KR" dirty="0"/>
-          </a:p>
-          <a:p>
-            <a:endParaRPr lang="en-US" altLang="ko-KR" dirty="0"/>
-          </a:p>
-          <a:p>
-            <a:r>
-              <a:rPr lang="en-US" altLang="ko-KR" dirty="0"/>
-              <a:t>Reactor</a:t>
-            </a:r>
-            <a:r>
-              <a:rPr lang="ko-KR" altLang="en-US" dirty="0"/>
-              <a:t> 도 이 </a:t>
-            </a:r>
-            <a:r>
-              <a:rPr lang="en-US" altLang="ko-KR" dirty="0" err="1"/>
-              <a:t>RxJava</a:t>
-            </a:r>
-            <a:r>
-              <a:rPr lang="en-US" altLang="ko-KR" dirty="0"/>
-              <a:t> </a:t>
-            </a:r>
-            <a:r>
-              <a:rPr lang="ko-KR" altLang="en-US" dirty="0"/>
-              <a:t>와 용법이 매우 유사합니다</a:t>
+              <a:t>Netty</a:t>
+            </a:r>
+            <a:r>
+              <a:rPr lang="ko-KR" altLang="en-US" dirty="0"/>
+              <a:t> 를 이용해 만들어졌습니다</a:t>
             </a:r>
             <a:r>
               <a:rPr lang="en-US" altLang="ko-KR" dirty="0"/>
               <a:t>.</a:t>
             </a:r>
-          </a:p>
-          <a:p>
-            <a:endParaRPr lang="en-US" altLang="ko-KR" dirty="0"/>
-          </a:p>
-          <a:p>
-            <a:endParaRPr lang="en-US" altLang="ko-KR" dirty="0"/>
           </a:p>
           <a:p>
             <a:endParaRPr lang="en-US" altLang="ko-KR" dirty="0"/>
@@ -2111,7 +1998,7 @@
     </p:spTree>
     <p:extLst>
       <p:ext uri="{BB962C8B-B14F-4D97-AF65-F5344CB8AC3E}">
-        <p14:creationId xmlns:p14="http://schemas.microsoft.com/office/powerpoint/2010/main" val="1287834120"/>
+        <p14:creationId xmlns:p14="http://schemas.microsoft.com/office/powerpoint/2010/main" val="1260209787"/>
       </p:ext>
     </p:extLst>
   </p:cSld>
@@ -2167,15 +2054,73 @@
           <a:p>
             <a:r>
               <a:rPr lang="ko-KR" altLang="en-US" dirty="0"/>
-              <a:t>비동기 </a:t>
+              <a:t>다음으로 </a:t>
             </a:r>
             <a:r>
               <a:rPr lang="en-US" altLang="ko-KR" dirty="0"/>
-              <a:t>API</a:t>
-            </a:r>
-            <a:r>
-              <a:rPr lang="ko-KR" altLang="en-US" dirty="0"/>
-              <a:t>를 만들어보기에 앞서</a:t>
+              <a:t>Spring </a:t>
+            </a:r>
+            <a:r>
+              <a:rPr lang="en-US" altLang="ko-KR" dirty="0" err="1"/>
+              <a:t>Webflux</a:t>
+            </a:r>
+            <a:r>
+              <a:rPr lang="en-US" altLang="ko-KR" dirty="0"/>
+              <a:t> stack </a:t>
+            </a:r>
+            <a:r>
+              <a:rPr lang="ko-KR" altLang="en-US" dirty="0"/>
+              <a:t>에서 비즈니스 로직을 구현하기 위한 </a:t>
+            </a:r>
+            <a:r>
+              <a:rPr lang="en-US" altLang="ko-KR" dirty="0"/>
+              <a:t>Reactor</a:t>
+            </a:r>
+            <a:r>
+              <a:rPr lang="ko-KR" altLang="en-US" dirty="0"/>
+              <a:t> 란 라이브러리 살펴보겠습니다</a:t>
+            </a:r>
+            <a:r>
+              <a:rPr lang="en-US" altLang="ko-KR" dirty="0"/>
+              <a:t>.</a:t>
+            </a:r>
+          </a:p>
+          <a:p>
+            <a:endParaRPr lang="en-US" altLang="ko-KR" dirty="0"/>
+          </a:p>
+          <a:p>
+            <a:r>
+              <a:rPr lang="en-US" altLang="ko-KR" dirty="0"/>
+              <a:t>&lt;&lt;</a:t>
+            </a:r>
+            <a:r>
+              <a:rPr lang="ko-KR" altLang="en-US" dirty="0"/>
+              <a:t>설명</a:t>
+            </a:r>
+            <a:r>
+              <a:rPr lang="en-US" altLang="ko-KR" dirty="0"/>
+              <a:t>&gt;&gt;</a:t>
+            </a:r>
+          </a:p>
+          <a:p>
+            <a:endParaRPr lang="en-US" altLang="ko-KR" dirty="0"/>
+          </a:p>
+          <a:p>
+            <a:r>
+              <a:rPr lang="en-US" altLang="ko-KR" dirty="0"/>
+              <a:t>Netflix </a:t>
+            </a:r>
+            <a:r>
+              <a:rPr lang="ko-KR" altLang="en-US" dirty="0"/>
+              <a:t>에서도 </a:t>
+            </a:r>
+            <a:r>
+              <a:rPr lang="en-US" altLang="ko-KR" dirty="0"/>
+              <a:t>Microservice </a:t>
+            </a:r>
+            <a:r>
+              <a:rPr lang="ko-KR" altLang="en-US" dirty="0"/>
+              <a:t>간 부하 전파에 대해 비슷한 고민을 하고 있었으며</a:t>
             </a:r>
             <a:r>
               <a:rPr lang="en-US" altLang="ko-KR" dirty="0"/>
@@ -2183,15 +2128,49 @@
             </a:r>
             <a:r>
               <a:rPr lang="ko-KR" altLang="en-US" dirty="0"/>
-              <a:t>우선 </a:t>
+              <a:t>이를 해결하기 위해 </a:t>
+            </a:r>
+            <a:r>
+              <a:rPr lang="en-US" altLang="ko-KR" dirty="0" err="1"/>
+              <a:t>RxJava</a:t>
+            </a:r>
+            <a:r>
+              <a:rPr lang="ko-KR" altLang="en-US" dirty="0"/>
+              <a:t>란 비동기 </a:t>
             </a:r>
             <a:r>
               <a:rPr lang="en-US" altLang="ko-KR" dirty="0"/>
-              <a:t>Reactor </a:t>
-            </a:r>
-            <a:r>
-              <a:rPr lang="ko-KR" altLang="en-US" dirty="0"/>
-              <a:t>를 간단히 배워보도록 하겠습니다</a:t>
+              <a:t>NIO </a:t>
+            </a:r>
+            <a:r>
+              <a:rPr lang="ko-KR" altLang="en-US" dirty="0"/>
+              <a:t>프레임워크를 만들었는데</a:t>
+            </a:r>
+            <a:endParaRPr lang="en-US" altLang="ko-KR" dirty="0"/>
+          </a:p>
+          <a:p>
+            <a:endParaRPr lang="en-US" altLang="ko-KR" dirty="0"/>
+          </a:p>
+          <a:p>
+            <a:r>
+              <a:rPr lang="en-US" altLang="ko-KR" dirty="0"/>
+              <a:t>Reactor</a:t>
+            </a:r>
+            <a:r>
+              <a:rPr lang="ko-KR" altLang="en-US" dirty="0"/>
+              <a:t> 도 이 </a:t>
+            </a:r>
+            <a:r>
+              <a:rPr lang="en-US" altLang="ko-KR" dirty="0" err="1"/>
+              <a:t>RxJava</a:t>
+            </a:r>
+            <a:r>
+              <a:rPr lang="en-US" altLang="ko-KR" dirty="0"/>
+              <a:t> </a:t>
+            </a:r>
+            <a:r>
+              <a:rPr lang="ko-KR" altLang="en-US" dirty="0"/>
+              <a:t>와 용법이 매우 유사합니다</a:t>
             </a:r>
             <a:r>
               <a:rPr lang="en-US" altLang="ko-KR" dirty="0"/>
@@ -2202,50 +2181,10 @@
             <a:endParaRPr lang="en-US" altLang="ko-KR" dirty="0"/>
           </a:p>
           <a:p>
-            <a:r>
-              <a:rPr lang="ko-KR" altLang="en-US" dirty="0"/>
-              <a:t>저희 최종 목표는 </a:t>
-            </a:r>
-            <a:r>
-              <a:rPr lang="en-US" altLang="ko-KR" dirty="0"/>
-              <a:t>Reactor </a:t>
-            </a:r>
-            <a:r>
-              <a:rPr lang="ko-KR" altLang="en-US" dirty="0"/>
-              <a:t>가 아니기 때문에</a:t>
-            </a:r>
-            <a:r>
-              <a:rPr lang="en-US" altLang="ko-KR" dirty="0"/>
-              <a:t>, </a:t>
-            </a:r>
-            <a:r>
-              <a:rPr lang="ko-KR" altLang="en-US" dirty="0"/>
-              <a:t>절대 </a:t>
-            </a:r>
-            <a:r>
-              <a:rPr lang="ko-KR" altLang="en-US" dirty="0" err="1"/>
-              <a:t>깊이있게</a:t>
-            </a:r>
-            <a:r>
-              <a:rPr lang="ko-KR" altLang="en-US" dirty="0"/>
-              <a:t> 들어가진 않습니다</a:t>
-            </a:r>
-            <a:r>
-              <a:rPr lang="en-US" altLang="ko-KR" dirty="0"/>
-              <a:t>. </a:t>
-            </a:r>
-            <a:r>
-              <a:rPr lang="ko-KR" altLang="en-US" dirty="0"/>
-              <a:t>가벼운 마음으로 만들어 </a:t>
-            </a:r>
-            <a:r>
-              <a:rPr lang="ko-KR" altLang="en-US" dirty="0" err="1"/>
-              <a:t>보실께요</a:t>
-            </a:r>
-            <a:r>
-              <a:rPr lang="en-US" altLang="ko-KR" dirty="0"/>
-              <a:t>.</a:t>
-            </a:r>
+            <a:endParaRPr lang="en-US" altLang="ko-KR" dirty="0"/>
+          </a:p>
+          <a:p>
+            <a:endParaRPr lang="en-US" altLang="ko-KR" dirty="0"/>
           </a:p>
         </p:txBody>
       </p:sp>
@@ -2275,7 +2214,7 @@
     </p:spTree>
     <p:extLst>
       <p:ext uri="{BB962C8B-B14F-4D97-AF65-F5344CB8AC3E}">
-        <p14:creationId xmlns:p14="http://schemas.microsoft.com/office/powerpoint/2010/main" val="3267945402"/>
+        <p14:creationId xmlns:p14="http://schemas.microsoft.com/office/powerpoint/2010/main" val="1287834120"/>
       </p:ext>
     </p:extLst>
   </p:cSld>
@@ -2331,19 +2270,43 @@
           <a:p>
             <a:r>
               <a:rPr lang="ko-KR" altLang="en-US" dirty="0"/>
-              <a:t>다시 </a:t>
+              <a:t>비동기 </a:t>
             </a:r>
             <a:r>
               <a:rPr lang="en-US" altLang="ko-KR" dirty="0"/>
-              <a:t>API </a:t>
-            </a:r>
-            <a:r>
-              <a:rPr lang="ko-KR" altLang="en-US" dirty="0"/>
-              <a:t>구현으로 돌아와서</a:t>
+              <a:t>API</a:t>
+            </a:r>
+            <a:r>
+              <a:rPr lang="ko-KR" altLang="en-US" dirty="0"/>
+              <a:t>를 만들어보기에 앞서</a:t>
             </a:r>
             <a:r>
               <a:rPr lang="en-US" altLang="ko-KR" dirty="0"/>
-              <a:t>…</a:t>
+              <a:t>, </a:t>
+            </a:r>
+            <a:r>
+              <a:rPr lang="ko-KR" altLang="en-US" dirty="0"/>
+              <a:t>우선 </a:t>
+            </a:r>
+            <a:r>
+              <a:rPr lang="en-US" altLang="ko-KR" dirty="0"/>
+              <a:t>Reactor </a:t>
+            </a:r>
+            <a:r>
+              <a:rPr lang="ko-KR" altLang="en-US" dirty="0"/>
+              <a:t>를 </a:t>
+            </a:r>
+            <a:r>
+              <a:rPr lang="ko-KR" altLang="en-US"/>
+              <a:t>간단히 만져보도록 </a:t>
+            </a:r>
+            <a:r>
+              <a:rPr lang="ko-KR" altLang="en-US" dirty="0"/>
+              <a:t>하겠습니다</a:t>
+            </a:r>
+            <a:r>
+              <a:rPr lang="en-US" altLang="ko-KR" dirty="0"/>
+              <a:t>.</a:t>
             </a:r>
           </a:p>
           <a:p>
@@ -2351,32 +2314,40 @@
           </a:p>
           <a:p>
             <a:r>
-              <a:rPr lang="en-US" altLang="ko-KR" dirty="0" err="1"/>
-              <a:t>Webflux</a:t>
+              <a:rPr lang="ko-KR" altLang="en-US" dirty="0"/>
+              <a:t>저희 최종 목표는 </a:t>
             </a:r>
             <a:r>
               <a:rPr lang="en-US" altLang="ko-KR" dirty="0"/>
-              <a:t> Reactor </a:t>
-            </a:r>
-            <a:r>
-              <a:rPr lang="ko-KR" altLang="en-US" dirty="0"/>
-              <a:t>로</a:t>
+              <a:t>Reactor </a:t>
+            </a:r>
+            <a:r>
+              <a:rPr lang="ko-KR" altLang="en-US" dirty="0"/>
+              <a:t>가 아니기 때문에</a:t>
             </a:r>
             <a:r>
               <a:rPr lang="en-US" altLang="ko-KR" dirty="0"/>
-              <a:t> </a:t>
-            </a:r>
-            <a:r>
-              <a:rPr lang="ko-KR" altLang="en-US" dirty="0"/>
-              <a:t>구현해 볼 내용은 </a:t>
+              <a:t>, </a:t>
+            </a:r>
+            <a:r>
+              <a:rPr lang="ko-KR" altLang="en-US" dirty="0" err="1"/>
+              <a:t>깊이있게</a:t>
+            </a:r>
+            <a:r>
+              <a:rPr lang="ko-KR" altLang="en-US" dirty="0"/>
+              <a:t> 들어가진 않습니다</a:t>
             </a:r>
             <a:r>
               <a:rPr lang="en-US" altLang="ko-KR" dirty="0"/>
-              <a:t>Spring MVC</a:t>
-            </a:r>
-            <a:r>
-              <a:rPr lang="ko-KR" altLang="en-US" dirty="0"/>
-              <a:t>와 동일합니다</a:t>
+              <a:t>. </a:t>
+            </a:r>
+            <a:r>
+              <a:rPr lang="ko-KR" altLang="en-US" dirty="0"/>
+              <a:t>가벼운 마음으로 만들어 </a:t>
+            </a:r>
+            <a:r>
+              <a:rPr lang="ko-KR" altLang="en-US" dirty="0" err="1"/>
+              <a:t>보실께요</a:t>
             </a:r>
             <a:r>
               <a:rPr lang="en-US" altLang="ko-KR" dirty="0"/>
@@ -2411,7 +2382,7 @@
     </p:spTree>
     <p:extLst>
       <p:ext uri="{BB962C8B-B14F-4D97-AF65-F5344CB8AC3E}">
-        <p14:creationId xmlns:p14="http://schemas.microsoft.com/office/powerpoint/2010/main" val="1978714165"/>
+        <p14:creationId xmlns:p14="http://schemas.microsoft.com/office/powerpoint/2010/main" val="3267945402"/>
       </p:ext>
     </p:extLst>
   </p:cSld>
@@ -4138,6 +4109,371 @@
               <a:buNone/>
             </a:pPr>
             <a:r>
+              <a:rPr lang="ko-KR" altLang="en-US" dirty="0"/>
+              <a:t>구현내용</a:t>
+            </a:r>
+            <a:endParaRPr lang="en-US" altLang="ko-KR" dirty="0"/>
+          </a:p>
+        </p:txBody>
+      </p:sp>
+      <p:sp>
+        <p:nvSpPr>
+          <p:cNvPr id="7" name="Google Shape;209;p30">
+            <a:extLst>
+              <a:ext uri="{FF2B5EF4-FFF2-40B4-BE49-F238E27FC236}">
+                <a16:creationId xmlns:a16="http://schemas.microsoft.com/office/drawing/2014/main" id="{35F3E219-4EBB-8DE8-0966-E4317399395E}"/>
+              </a:ext>
+            </a:extLst>
+          </p:cNvPr>
+          <p:cNvSpPr/>
+          <p:nvPr/>
+        </p:nvSpPr>
+        <p:spPr>
+          <a:xfrm>
+            <a:off x="7811013" y="528014"/>
+            <a:ext cx="952500" cy="298200"/>
+          </a:xfrm>
+          <a:prstGeom prst="rect">
+            <a:avLst/>
+          </a:prstGeom>
+          <a:noFill/>
+          <a:ln>
+            <a:noFill/>
+          </a:ln>
+        </p:spPr>
+        <p:txBody>
+          <a:bodyPr spcFirstLastPara="1" wrap="square" lIns="19050" tIns="19050" rIns="19050" bIns="19050" anchor="t" anchorCtr="0">
+            <a:noAutofit/>
+          </a:bodyPr>
+          <a:lstStyle/>
+          <a:p>
+            <a:pPr marL="63500" marR="0" lvl="1" indent="0" algn="l" rtl="0">
+              <a:lnSpc>
+                <a:spcPct val="90000"/>
+              </a:lnSpc>
+              <a:spcBef>
+                <a:spcPts val="0"/>
+              </a:spcBef>
+              <a:spcAft>
+                <a:spcPts val="0"/>
+              </a:spcAft>
+              <a:buNone/>
+            </a:pPr>
+            <a:r>
+              <a:rPr lang="en-US" altLang="ko" sz="1200" b="1" i="0" u="none" strike="noStrike" cap="none" dirty="0">
+                <a:solidFill>
+                  <a:schemeClr val="bg1"/>
+                </a:solidFill>
+                <a:latin typeface="Arial"/>
+                <a:ea typeface="Arial"/>
+                <a:cs typeface="Arial"/>
+                <a:sym typeface="Arial"/>
+              </a:rPr>
+              <a:t>1</a:t>
+            </a:r>
+            <a:r>
+              <a:rPr lang="ko" sz="1200" b="1" i="0" u="none" strike="noStrike" cap="none" dirty="0">
+                <a:solidFill>
+                  <a:schemeClr val="bg1"/>
+                </a:solidFill>
+                <a:latin typeface="Arial"/>
+                <a:ea typeface="Arial"/>
+                <a:cs typeface="Arial"/>
+                <a:sym typeface="Arial"/>
+              </a:rPr>
+              <a:t>.</a:t>
+            </a:r>
+            <a:endParaRPr sz="500" dirty="0">
+              <a:solidFill>
+                <a:schemeClr val="bg1"/>
+              </a:solidFill>
+            </a:endParaRPr>
+          </a:p>
+        </p:txBody>
+      </p:sp>
+      <p:sp>
+        <p:nvSpPr>
+          <p:cNvPr id="8" name="Google Shape;210;p30">
+            <a:extLst>
+              <a:ext uri="{FF2B5EF4-FFF2-40B4-BE49-F238E27FC236}">
+                <a16:creationId xmlns:a16="http://schemas.microsoft.com/office/drawing/2014/main" id="{8CB63A74-B5C7-DCAA-53F5-96E44004D694}"/>
+              </a:ext>
+            </a:extLst>
+          </p:cNvPr>
+          <p:cNvSpPr/>
+          <p:nvPr/>
+        </p:nvSpPr>
+        <p:spPr>
+          <a:xfrm>
+            <a:off x="7811013" y="825047"/>
+            <a:ext cx="952500" cy="293400"/>
+          </a:xfrm>
+          <a:prstGeom prst="rect">
+            <a:avLst/>
+          </a:prstGeom>
+          <a:noFill/>
+          <a:ln>
+            <a:noFill/>
+          </a:ln>
+        </p:spPr>
+        <p:txBody>
+          <a:bodyPr spcFirstLastPara="1" wrap="square" lIns="19050" tIns="19050" rIns="19050" bIns="19050" anchor="t" anchorCtr="0">
+            <a:noAutofit/>
+          </a:bodyPr>
+          <a:lstStyle/>
+          <a:p>
+            <a:pPr marL="63500" marR="0" lvl="1" indent="0" algn="l" rtl="0">
+              <a:spcBef>
+                <a:spcPts val="200"/>
+              </a:spcBef>
+              <a:spcAft>
+                <a:spcPts val="0"/>
+              </a:spcAft>
+              <a:buClr>
+                <a:srgbClr val="000000"/>
+              </a:buClr>
+              <a:buFont typeface="Arial"/>
+              <a:buNone/>
+            </a:pPr>
+            <a:r>
+              <a:rPr lang="ko-KR" altLang="en-US" sz="800" dirty="0">
+                <a:solidFill>
+                  <a:schemeClr val="bg1"/>
+                </a:solidFill>
+              </a:rPr>
+              <a:t>소개 및 환경구성</a:t>
+            </a:r>
+            <a:endParaRPr sz="800" dirty="0">
+              <a:solidFill>
+                <a:schemeClr val="bg1"/>
+              </a:solidFill>
+            </a:endParaRPr>
+          </a:p>
+        </p:txBody>
+      </p:sp>
+      <p:sp>
+        <p:nvSpPr>
+          <p:cNvPr id="6" name="TextBox 5">
+            <a:extLst>
+              <a:ext uri="{FF2B5EF4-FFF2-40B4-BE49-F238E27FC236}">
+                <a16:creationId xmlns:a16="http://schemas.microsoft.com/office/drawing/2014/main" id="{A39D204B-5E6E-B41A-E4C9-3CF4ADB9FA39}"/>
+              </a:ext>
+            </a:extLst>
+          </p:cNvPr>
+          <p:cNvSpPr txBox="1"/>
+          <p:nvPr/>
+        </p:nvSpPr>
+        <p:spPr>
+          <a:xfrm>
+            <a:off x="4572000" y="2014406"/>
+            <a:ext cx="609462" cy="415498"/>
+          </a:xfrm>
+          <a:prstGeom prst="rect">
+            <a:avLst/>
+          </a:prstGeom>
+          <a:noFill/>
+        </p:spPr>
+        <p:txBody>
+          <a:bodyPr wrap="none" rtlCol="0">
+            <a:spAutoFit/>
+          </a:bodyPr>
+          <a:lstStyle/>
+          <a:p>
+            <a:r>
+              <a:rPr lang="en-US" altLang="ko-KR" sz="2100" dirty="0">
+                <a:latin typeface="Spoqa Han Sans Neo Medium" pitchFamily="2" charset="-127"/>
+                <a:ea typeface="Spoqa Han Sans Neo Medium" pitchFamily="2" charset="-127"/>
+              </a:rPr>
+              <a:t>API</a:t>
+            </a:r>
+            <a:endParaRPr lang="ko-KR" altLang="en-US" sz="2100" dirty="0">
+              <a:latin typeface="Spoqa Han Sans Neo Medium" pitchFamily="2" charset="-127"/>
+              <a:ea typeface="Spoqa Han Sans Neo Medium" pitchFamily="2" charset="-127"/>
+            </a:endParaRPr>
+          </a:p>
+        </p:txBody>
+      </p:sp>
+      <p:pic>
+        <p:nvPicPr>
+          <p:cNvPr id="10" name="그림 9">
+            <a:extLst>
+              <a:ext uri="{FF2B5EF4-FFF2-40B4-BE49-F238E27FC236}">
+                <a16:creationId xmlns:a16="http://schemas.microsoft.com/office/drawing/2014/main" id="{F89081F6-7C1F-033F-70EB-FE9BF669F526}"/>
+              </a:ext>
+            </a:extLst>
+          </p:cNvPr>
+          <p:cNvPicPr>
+            <a:picLocks noChangeAspect="1"/>
+          </p:cNvPicPr>
+          <p:nvPr/>
+        </p:nvPicPr>
+        <p:blipFill>
+          <a:blip r:embed="rId3"/>
+          <a:stretch>
+            <a:fillRect/>
+          </a:stretch>
+        </p:blipFill>
+        <p:spPr>
+          <a:xfrm>
+            <a:off x="4401063" y="2423854"/>
+            <a:ext cx="4249311" cy="2522318"/>
+          </a:xfrm>
+          <a:prstGeom prst="rect">
+            <a:avLst/>
+          </a:prstGeom>
+        </p:spPr>
+      </p:pic>
+      <p:pic>
+        <p:nvPicPr>
+          <p:cNvPr id="12" name="그림 11">
+            <a:extLst>
+              <a:ext uri="{FF2B5EF4-FFF2-40B4-BE49-F238E27FC236}">
+                <a16:creationId xmlns:a16="http://schemas.microsoft.com/office/drawing/2014/main" id="{2FBE5B6E-1A60-94D9-187F-913C139920B9}"/>
+              </a:ext>
+            </a:extLst>
+          </p:cNvPr>
+          <p:cNvPicPr>
+            <a:picLocks noChangeAspect="1"/>
+          </p:cNvPicPr>
+          <p:nvPr/>
+        </p:nvPicPr>
+        <p:blipFill>
+          <a:blip r:embed="rId4"/>
+          <a:stretch>
+            <a:fillRect/>
+          </a:stretch>
+        </p:blipFill>
+        <p:spPr>
+          <a:xfrm>
+            <a:off x="802803" y="2423854"/>
+            <a:ext cx="3313233" cy="2522318"/>
+          </a:xfrm>
+          <a:prstGeom prst="rect">
+            <a:avLst/>
+          </a:prstGeom>
+        </p:spPr>
+      </p:pic>
+      <p:sp>
+        <p:nvSpPr>
+          <p:cNvPr id="13" name="TextBox 12">
+            <a:extLst>
+              <a:ext uri="{FF2B5EF4-FFF2-40B4-BE49-F238E27FC236}">
+                <a16:creationId xmlns:a16="http://schemas.microsoft.com/office/drawing/2014/main" id="{C1D81F25-AA1B-5D79-2481-6935028480F3}"/>
+              </a:ext>
+            </a:extLst>
+          </p:cNvPr>
+          <p:cNvSpPr txBox="1"/>
+          <p:nvPr/>
+        </p:nvSpPr>
+        <p:spPr>
+          <a:xfrm>
+            <a:off x="831495" y="1981792"/>
+            <a:ext cx="1178528" cy="415498"/>
+          </a:xfrm>
+          <a:prstGeom prst="rect">
+            <a:avLst/>
+          </a:prstGeom>
+          <a:noFill/>
+        </p:spPr>
+        <p:txBody>
+          <a:bodyPr wrap="none" rtlCol="0">
+            <a:spAutoFit/>
+          </a:bodyPr>
+          <a:lstStyle/>
+          <a:p>
+            <a:r>
+              <a:rPr lang="ko-KR" altLang="en-US" sz="2100" dirty="0">
+                <a:latin typeface="Spoqa Han Sans Neo Medium" pitchFamily="2" charset="-127"/>
+                <a:ea typeface="Spoqa Han Sans Neo Medium" pitchFamily="2" charset="-127"/>
+              </a:rPr>
+              <a:t>자료구조</a:t>
+            </a:r>
+          </a:p>
+        </p:txBody>
+      </p:sp>
+    </p:spTree>
+    <p:extLst>
+      <p:ext uri="{BB962C8B-B14F-4D97-AF65-F5344CB8AC3E}">
+        <p14:creationId xmlns:p14="http://schemas.microsoft.com/office/powerpoint/2010/main" val="824592560"/>
+      </p:ext>
+    </p:extLst>
+  </p:cSld>
+  <p:clrMapOvr>
+    <a:masterClrMapping/>
+  </p:clrMapOvr>
+</p:sld>
+</file>
+
+<file path=ppt/slides/slide11.xml><?xml version="1.0" encoding="utf-8"?>
+<p:sld xmlns:a="http://schemas.openxmlformats.org/drawingml/2006/main" xmlns:r="http://schemas.openxmlformats.org/officeDocument/2006/relationships" xmlns:p="http://schemas.openxmlformats.org/presentationml/2006/main">
+  <p:cSld>
+    <p:spTree>
+      <p:nvGrpSpPr>
+        <p:cNvPr id="1" name=""/>
+        <p:cNvGrpSpPr/>
+        <p:nvPr/>
+      </p:nvGrpSpPr>
+      <p:grpSpPr>
+        <a:xfrm>
+          <a:off x="0" y="0"/>
+          <a:ext cx="0" cy="0"/>
+          <a:chOff x="0" y="0"/>
+          <a:chExt cx="0" cy="0"/>
+        </a:xfrm>
+      </p:grpSpPr>
+      <p:sp>
+        <p:nvSpPr>
+          <p:cNvPr id="2" name="제목 1">
+            <a:extLst>
+              <a:ext uri="{FF2B5EF4-FFF2-40B4-BE49-F238E27FC236}">
+                <a16:creationId xmlns:a16="http://schemas.microsoft.com/office/drawing/2014/main" id="{D21C1AA9-5E52-3A11-B3B3-447787E29D09}"/>
+              </a:ext>
+            </a:extLst>
+          </p:cNvPr>
+          <p:cNvSpPr>
+            <a:spLocks noGrp="1"/>
+          </p:cNvSpPr>
+          <p:nvPr>
+            <p:ph type="title"/>
+          </p:nvPr>
+        </p:nvSpPr>
+        <p:spPr/>
+        <p:txBody>
+          <a:bodyPr/>
+          <a:lstStyle/>
+          <a:p>
+            <a:r>
+              <a:rPr lang="ko-KR" altLang="en-US" dirty="0"/>
+              <a:t>구현내용 및 개발환경 구성</a:t>
+            </a:r>
+          </a:p>
+        </p:txBody>
+      </p:sp>
+      <p:sp>
+        <p:nvSpPr>
+          <p:cNvPr id="4" name="내용 개체 틀 3">
+            <a:extLst>
+              <a:ext uri="{FF2B5EF4-FFF2-40B4-BE49-F238E27FC236}">
+                <a16:creationId xmlns:a16="http://schemas.microsoft.com/office/drawing/2014/main" id="{42F6317C-F28B-ECBE-0810-17736FC7D8AB}"/>
+              </a:ext>
+            </a:extLst>
+          </p:cNvPr>
+          <p:cNvSpPr>
+            <a:spLocks noGrp="1"/>
+          </p:cNvSpPr>
+          <p:nvPr>
+            <p:ph idx="1"/>
+          </p:nvPr>
+        </p:nvSpPr>
+        <p:spPr/>
+        <p:txBody>
+          <a:bodyPr/>
+          <a:lstStyle/>
+          <a:p>
+            <a:pPr marL="0" indent="0">
+              <a:buNone/>
+            </a:pPr>
+            <a:r>
               <a:rPr lang="en-US" altLang="ko-KR" dirty="0"/>
               <a:t>Spring </a:t>
             </a:r>
@@ -4383,128 +4719,6 @@
 </p:sld>
 </file>
 
-<file path=ppt/slides/slide11.xml><?xml version="1.0" encoding="utf-8"?>
-<p:sld xmlns:a="http://schemas.openxmlformats.org/drawingml/2006/main" xmlns:r="http://schemas.openxmlformats.org/officeDocument/2006/relationships" xmlns:p="http://schemas.openxmlformats.org/presentationml/2006/main">
-  <p:cSld>
-    <p:spTree>
-      <p:nvGrpSpPr>
-        <p:cNvPr id="1" name=""/>
-        <p:cNvGrpSpPr/>
-        <p:nvPr/>
-      </p:nvGrpSpPr>
-      <p:grpSpPr>
-        <a:xfrm>
-          <a:off x="0" y="0"/>
-          <a:ext cx="0" cy="0"/>
-          <a:chOff x="0" y="0"/>
-          <a:chExt cx="0" cy="0"/>
-        </a:xfrm>
-      </p:grpSpPr>
-      <p:sp>
-        <p:nvSpPr>
-          <p:cNvPr id="2" name="제목 1">
-            <a:extLst>
-              <a:ext uri="{FF2B5EF4-FFF2-40B4-BE49-F238E27FC236}">
-                <a16:creationId xmlns:a16="http://schemas.microsoft.com/office/drawing/2014/main" id="{9896B29B-A1AE-E0C6-8543-753E63140B1C}"/>
-              </a:ext>
-            </a:extLst>
-          </p:cNvPr>
-          <p:cNvSpPr>
-            <a:spLocks noGrp="1"/>
-          </p:cNvSpPr>
-          <p:nvPr>
-            <p:ph type="ctrTitle"/>
-          </p:nvPr>
-        </p:nvSpPr>
-        <p:spPr/>
-        <p:txBody>
-          <a:bodyPr>
-            <a:normAutofit/>
-          </a:bodyPr>
-          <a:lstStyle/>
-          <a:p>
-            <a:r>
-              <a:rPr lang="ko-KR" altLang="en-US" b="1" dirty="0"/>
-              <a:t>비동기 서비스 구현 </a:t>
-            </a:r>
-            <a:r>
-              <a:rPr lang="en-US" altLang="ko-KR" sz="2000" b="1" dirty="0"/>
-              <a:t>(Spring </a:t>
-            </a:r>
-            <a:r>
-              <a:rPr lang="en-US" altLang="ko-KR" sz="2000" b="1" dirty="0" err="1"/>
-              <a:t>Webflux</a:t>
-            </a:r>
-            <a:r>
-              <a:rPr lang="en-US" altLang="ko-KR" sz="2000" b="1" dirty="0"/>
-              <a:t>)</a:t>
-            </a:r>
-            <a:endParaRPr lang="ko-KR" altLang="en-US" b="1" dirty="0"/>
-          </a:p>
-        </p:txBody>
-      </p:sp>
-      <p:sp>
-        <p:nvSpPr>
-          <p:cNvPr id="4" name="부제목 3">
-            <a:extLst>
-              <a:ext uri="{FF2B5EF4-FFF2-40B4-BE49-F238E27FC236}">
-                <a16:creationId xmlns:a16="http://schemas.microsoft.com/office/drawing/2014/main" id="{7219E4B9-47F6-C7CA-B046-1256225C3574}"/>
-              </a:ext>
-            </a:extLst>
-          </p:cNvPr>
-          <p:cNvSpPr>
-            <a:spLocks noGrp="1"/>
-          </p:cNvSpPr>
-          <p:nvPr>
-            <p:ph type="subTitle" idx="1"/>
-          </p:nvPr>
-        </p:nvSpPr>
-        <p:spPr/>
-        <p:txBody>
-          <a:bodyPr>
-            <a:normAutofit/>
-          </a:bodyPr>
-          <a:lstStyle/>
-          <a:p>
-            <a:pPr marL="0" indent="0" algn="r">
-              <a:buNone/>
-            </a:pPr>
-            <a:r>
-              <a:rPr lang="en-US" altLang="ko" b="1" dirty="0">
-                <a:solidFill>
-                  <a:srgbClr val="ED234B"/>
-                </a:solidFill>
-              </a:rPr>
-              <a:t>2</a:t>
-            </a:r>
-            <a:r>
-              <a:rPr lang="ko" altLang="ko-KR" b="1" dirty="0">
-                <a:solidFill>
-                  <a:srgbClr val="ED234B"/>
-                </a:solidFill>
-              </a:rPr>
-              <a:t> </a:t>
-            </a:r>
-            <a:r>
-              <a:rPr lang="ko-KR" altLang="en-US" dirty="0"/>
-              <a:t>서비스 구현</a:t>
-            </a:r>
-          </a:p>
-        </p:txBody>
-      </p:sp>
-    </p:spTree>
-    <p:extLst>
-      <p:ext uri="{BB962C8B-B14F-4D97-AF65-F5344CB8AC3E}">
-        <p14:creationId xmlns:p14="http://schemas.microsoft.com/office/powerpoint/2010/main" val="2984680853"/>
-      </p:ext>
-    </p:extLst>
-  </p:cSld>
-  <p:clrMapOvr>
-    <a:masterClrMapping/>
-  </p:clrMapOvr>
-</p:sld>
-</file>
-
 <file path=ppt/slides/slide12.xml><?xml version="1.0" encoding="utf-8"?>
 <p:sld xmlns:a="http://schemas.openxmlformats.org/drawingml/2006/main" xmlns:r="http://schemas.openxmlformats.org/officeDocument/2006/relationships" xmlns:p="http://schemas.openxmlformats.org/presentationml/2006/main">
   <p:cSld>
@@ -4524,10 +4738,10 @@
       </p:grpSpPr>
       <p:sp>
         <p:nvSpPr>
-          <p:cNvPr id="4" name="제목 3">
+          <p:cNvPr id="2" name="제목 1">
             <a:extLst>
               <a:ext uri="{FF2B5EF4-FFF2-40B4-BE49-F238E27FC236}">
-                <a16:creationId xmlns:a16="http://schemas.microsoft.com/office/drawing/2014/main" id="{D283F7C5-AF5C-DEEF-FC15-4B59CEF592DE}"/>
+                <a16:creationId xmlns:a16="http://schemas.microsoft.com/office/drawing/2014/main" id="{9896B29B-A1AE-E0C6-8543-753E63140B1C}"/>
               </a:ext>
             </a:extLst>
           </p:cNvPr>
@@ -4540,22 +4754,37 @@
         </p:nvSpPr>
         <p:spPr/>
         <p:txBody>
-          <a:bodyPr/>
+          <a:bodyPr>
+            <a:normAutofit/>
+          </a:bodyPr>
           <a:lstStyle/>
           <a:p>
             <a:r>
-              <a:rPr lang="ko-KR" altLang="en-US" dirty="0"/>
-              <a:t>구현 실습</a:t>
-            </a:r>
-          </a:p>
-        </p:txBody>
-      </p:sp>
-      <p:sp>
-        <p:nvSpPr>
-          <p:cNvPr id="5" name="부제목 4">
+              <a:rPr lang="ko-KR" altLang="en-US" b="1" dirty="0"/>
+              <a:t>비동기 서비스 구현 </a:t>
+            </a:r>
+            <a:r>
+              <a:rPr lang="en-US" altLang="ko-KR" sz="2000" b="1" dirty="0"/>
+              <a:t>(Spring </a:t>
+            </a:r>
+            <a:r>
+              <a:rPr lang="en-US" altLang="ko-KR" sz="2000" b="1" dirty="0" err="1"/>
+              <a:t>Webflux</a:t>
+            </a:r>
+            <a:r>
+              <a:rPr lang="en-US" altLang="ko-KR" sz="2000" b="1" dirty="0"/>
+              <a:t>)</a:t>
+            </a:r>
+            <a:endParaRPr lang="ko-KR" altLang="en-US" b="1" dirty="0"/>
+          </a:p>
+        </p:txBody>
+      </p:sp>
+      <p:sp>
+        <p:nvSpPr>
+          <p:cNvPr id="4" name="부제목 3">
             <a:extLst>
               <a:ext uri="{FF2B5EF4-FFF2-40B4-BE49-F238E27FC236}">
-                <a16:creationId xmlns:a16="http://schemas.microsoft.com/office/drawing/2014/main" id="{C884C73A-BBA1-E6A6-DDF5-9A946E28E963}"/>
+                <a16:creationId xmlns:a16="http://schemas.microsoft.com/office/drawing/2014/main" id="{7219E4B9-47F6-C7CA-B046-1256225C3574}"/>
               </a:ext>
             </a:extLst>
           </p:cNvPr>
@@ -4568,23 +4797,33 @@
         </p:nvSpPr>
         <p:spPr/>
         <p:txBody>
-          <a:bodyPr/>
+          <a:bodyPr>
+            <a:normAutofit/>
+          </a:bodyPr>
           <a:lstStyle/>
           <a:p>
             <a:pPr marL="0" indent="0" algn="r">
               <a:buNone/>
             </a:pPr>
             <a:r>
-              <a:rPr lang="en-US" altLang="ko-KR" dirty="0"/>
-              <a:t>Hello world </a:t>
-            </a:r>
-            <a:r>
-              <a:rPr lang="en-US" altLang="ko-KR"/>
-              <a:t>API </a:t>
-            </a:r>
-            <a:r>
-              <a:rPr lang="ko-KR" altLang="en-US" dirty="0"/>
-              <a:t>구현</a:t>
+              <a:rPr lang="en-US" altLang="ko" b="1" dirty="0">
+                <a:solidFill>
+                  <a:srgbClr val="ED234B"/>
+                </a:solidFill>
+              </a:rPr>
+              <a:t>2</a:t>
+            </a:r>
+            <a:r>
+              <a:rPr lang="ko" altLang="ko-KR" b="1" dirty="0">
+                <a:solidFill>
+                  <a:srgbClr val="ED234B"/>
+                </a:solidFill>
+              </a:rPr>
+              <a:t> </a:t>
+            </a:r>
+            <a:r>
+              <a:rPr lang="ko-KR" altLang="en-US" dirty="0"/>
+              <a:t>서비스 구현</a:t>
             </a:r>
           </a:p>
         </p:txBody>
@@ -4592,7 +4831,7 @@
     </p:spTree>
     <p:extLst>
       <p:ext uri="{BB962C8B-B14F-4D97-AF65-F5344CB8AC3E}">
-        <p14:creationId xmlns:p14="http://schemas.microsoft.com/office/powerpoint/2010/main" val="2848712885"/>
+        <p14:creationId xmlns:p14="http://schemas.microsoft.com/office/powerpoint/2010/main" val="2984680853"/>
       </p:ext>
     </p:extLst>
   </p:cSld>
@@ -4673,6 +4912,103 @@
             </a:pPr>
             <a:r>
               <a:rPr lang="en-US" altLang="ko-KR" dirty="0"/>
+              <a:t>Hello world </a:t>
+            </a:r>
+            <a:r>
+              <a:rPr lang="en-US" altLang="ko-KR"/>
+              <a:t>API </a:t>
+            </a:r>
+            <a:r>
+              <a:rPr lang="ko-KR" altLang="en-US" dirty="0"/>
+              <a:t>구현</a:t>
+            </a:r>
+          </a:p>
+        </p:txBody>
+      </p:sp>
+    </p:spTree>
+    <p:extLst>
+      <p:ext uri="{BB962C8B-B14F-4D97-AF65-F5344CB8AC3E}">
+        <p14:creationId xmlns:p14="http://schemas.microsoft.com/office/powerpoint/2010/main" val="2848712885"/>
+      </p:ext>
+    </p:extLst>
+  </p:cSld>
+  <p:clrMapOvr>
+    <a:masterClrMapping/>
+  </p:clrMapOvr>
+</p:sld>
+</file>
+
+<file path=ppt/slides/slide14.xml><?xml version="1.0" encoding="utf-8"?>
+<p:sld xmlns:a="http://schemas.openxmlformats.org/drawingml/2006/main" xmlns:r="http://schemas.openxmlformats.org/officeDocument/2006/relationships" xmlns:p="http://schemas.openxmlformats.org/presentationml/2006/main">
+  <p:cSld>
+    <p:spTree>
+      <p:nvGrpSpPr>
+        <p:cNvPr id="1" name=""/>
+        <p:cNvGrpSpPr/>
+        <p:nvPr/>
+      </p:nvGrpSpPr>
+      <p:grpSpPr>
+        <a:xfrm>
+          <a:off x="0" y="0"/>
+          <a:ext cx="0" cy="0"/>
+          <a:chOff x="0" y="0"/>
+          <a:chExt cx="0" cy="0"/>
+        </a:xfrm>
+      </p:grpSpPr>
+      <p:sp>
+        <p:nvSpPr>
+          <p:cNvPr id="4" name="제목 3">
+            <a:extLst>
+              <a:ext uri="{FF2B5EF4-FFF2-40B4-BE49-F238E27FC236}">
+                <a16:creationId xmlns:a16="http://schemas.microsoft.com/office/drawing/2014/main" id="{D283F7C5-AF5C-DEEF-FC15-4B59CEF592DE}"/>
+              </a:ext>
+            </a:extLst>
+          </p:cNvPr>
+          <p:cNvSpPr>
+            <a:spLocks noGrp="1"/>
+          </p:cNvSpPr>
+          <p:nvPr>
+            <p:ph type="ctrTitle"/>
+          </p:nvPr>
+        </p:nvSpPr>
+        <p:spPr/>
+        <p:txBody>
+          <a:bodyPr/>
+          <a:lstStyle/>
+          <a:p>
+            <a:r>
+              <a:rPr lang="ko-KR" altLang="en-US" dirty="0"/>
+              <a:t>구현 실습</a:t>
+            </a:r>
+          </a:p>
+        </p:txBody>
+      </p:sp>
+      <p:sp>
+        <p:nvSpPr>
+          <p:cNvPr id="5" name="부제목 4">
+            <a:extLst>
+              <a:ext uri="{FF2B5EF4-FFF2-40B4-BE49-F238E27FC236}">
+                <a16:creationId xmlns:a16="http://schemas.microsoft.com/office/drawing/2014/main" id="{C884C73A-BBA1-E6A6-DDF5-9A946E28E963}"/>
+              </a:ext>
+            </a:extLst>
+          </p:cNvPr>
+          <p:cNvSpPr>
+            <a:spLocks noGrp="1"/>
+          </p:cNvSpPr>
+          <p:nvPr>
+            <p:ph type="subTitle" idx="1"/>
+          </p:nvPr>
+        </p:nvSpPr>
+        <p:spPr/>
+        <p:txBody>
+          <a:bodyPr/>
+          <a:lstStyle/>
+          <a:p>
+            <a:pPr marL="0" indent="0" algn="r">
+              <a:buNone/>
+            </a:pPr>
+            <a:r>
+              <a:rPr lang="en-US" altLang="ko-KR" dirty="0"/>
               <a:t>CRUD </a:t>
             </a:r>
             <a:r>
@@ -4695,7 +5031,7 @@
 </p:sld>
 </file>
 
-<file path=ppt/slides/slide14.xml><?xml version="1.0" encoding="utf-8"?>
+<file path=ppt/slides/slide15.xml><?xml version="1.0" encoding="utf-8"?>
 <p:sld xmlns:a="http://schemas.openxmlformats.org/drawingml/2006/main" xmlns:r="http://schemas.openxmlformats.org/officeDocument/2006/relationships" xmlns:p="http://schemas.openxmlformats.org/presentationml/2006/main">
   <p:cSld>
     <p:spTree>
@@ -6047,6 +6383,504 @@
       </p:sp>
       <p:sp>
         <p:nvSpPr>
+          <p:cNvPr id="4" name="내용 개체 틀 3">
+            <a:extLst>
+              <a:ext uri="{FF2B5EF4-FFF2-40B4-BE49-F238E27FC236}">
+                <a16:creationId xmlns:a16="http://schemas.microsoft.com/office/drawing/2014/main" id="{42F6317C-F28B-ECBE-0810-17736FC7D8AB}"/>
+              </a:ext>
+            </a:extLst>
+          </p:cNvPr>
+          <p:cNvSpPr>
+            <a:spLocks noGrp="1"/>
+          </p:cNvSpPr>
+          <p:nvPr>
+            <p:ph idx="1"/>
+          </p:nvPr>
+        </p:nvSpPr>
+        <p:spPr>
+          <a:xfrm>
+            <a:off x="628650" y="1171575"/>
+            <a:ext cx="3943350" cy="3971924"/>
+          </a:xfrm>
+        </p:spPr>
+        <p:txBody>
+          <a:bodyPr>
+            <a:normAutofit/>
+          </a:bodyPr>
+          <a:lstStyle/>
+          <a:p>
+            <a:pPr marL="0" indent="0">
+              <a:buNone/>
+            </a:pPr>
+            <a:r>
+              <a:rPr lang="ko-KR" altLang="en-US" dirty="0"/>
+              <a:t>장점</a:t>
+            </a:r>
+            <a:endParaRPr lang="en-US" altLang="ko-KR" dirty="0"/>
+          </a:p>
+          <a:p>
+            <a:pPr lvl="1"/>
+            <a:r>
+              <a:rPr lang="ko-KR" altLang="en-US" dirty="0"/>
+              <a:t>고성능</a:t>
+            </a:r>
+            <a:endParaRPr lang="en-US" altLang="ko-KR" dirty="0"/>
+          </a:p>
+          <a:p>
+            <a:pPr lvl="1"/>
+            <a:r>
+              <a:rPr lang="en-US" altLang="ko-KR" dirty="0"/>
+              <a:t>Spring </a:t>
+            </a:r>
+            <a:r>
+              <a:rPr lang="ko-KR" altLang="en-US" dirty="0"/>
+              <a:t>과의 완벽한 통합</a:t>
+            </a:r>
+            <a:endParaRPr lang="en-US" altLang="ko-KR" dirty="0"/>
+          </a:p>
+          <a:p>
+            <a:pPr lvl="1"/>
+            <a:r>
+              <a:rPr lang="en-US" altLang="ko-KR" dirty="0" err="1"/>
+              <a:t>Netty</a:t>
+            </a:r>
+            <a:r>
+              <a:rPr lang="en-US" altLang="ko-KR" dirty="0"/>
+              <a:t> </a:t>
+            </a:r>
+            <a:r>
+              <a:rPr lang="ko-KR" altLang="en-US" dirty="0"/>
+              <a:t>지원</a:t>
+            </a:r>
+            <a:endParaRPr lang="en-US" altLang="ko-KR" dirty="0"/>
+          </a:p>
+          <a:p>
+            <a:pPr lvl="1"/>
+            <a:r>
+              <a:rPr lang="ko-KR" altLang="en-US" dirty="0"/>
+              <a:t>비동기 </a:t>
+            </a:r>
+            <a:r>
+              <a:rPr lang="en-US" altLang="ko-KR" dirty="0"/>
+              <a:t>NIO </a:t>
+            </a:r>
+            <a:r>
+              <a:rPr lang="ko-KR" altLang="en-US" dirty="0"/>
+              <a:t>메시지 처리</a:t>
+            </a:r>
+            <a:endParaRPr lang="en-US" altLang="ko-KR" dirty="0"/>
+          </a:p>
+        </p:txBody>
+      </p:sp>
+      <p:sp>
+        <p:nvSpPr>
+          <p:cNvPr id="7" name="Google Shape;209;p30">
+            <a:extLst>
+              <a:ext uri="{FF2B5EF4-FFF2-40B4-BE49-F238E27FC236}">
+                <a16:creationId xmlns:a16="http://schemas.microsoft.com/office/drawing/2014/main" id="{35F3E219-4EBB-8DE8-0966-E4317399395E}"/>
+              </a:ext>
+            </a:extLst>
+          </p:cNvPr>
+          <p:cNvSpPr/>
+          <p:nvPr/>
+        </p:nvSpPr>
+        <p:spPr>
+          <a:xfrm>
+            <a:off x="7811013" y="528014"/>
+            <a:ext cx="952500" cy="298200"/>
+          </a:xfrm>
+          <a:prstGeom prst="rect">
+            <a:avLst/>
+          </a:prstGeom>
+          <a:noFill/>
+          <a:ln>
+            <a:noFill/>
+          </a:ln>
+        </p:spPr>
+        <p:txBody>
+          <a:bodyPr spcFirstLastPara="1" wrap="square" lIns="19050" tIns="19050" rIns="19050" bIns="19050" anchor="t" anchorCtr="0">
+            <a:noAutofit/>
+          </a:bodyPr>
+          <a:lstStyle/>
+          <a:p>
+            <a:pPr marL="63500" marR="0" lvl="1" indent="0" algn="l" rtl="0">
+              <a:lnSpc>
+                <a:spcPct val="90000"/>
+              </a:lnSpc>
+              <a:spcBef>
+                <a:spcPts val="0"/>
+              </a:spcBef>
+              <a:spcAft>
+                <a:spcPts val="0"/>
+              </a:spcAft>
+              <a:buNone/>
+            </a:pPr>
+            <a:r>
+              <a:rPr lang="en-US" altLang="ko" sz="1200" b="1" i="0" u="none" strike="noStrike" cap="none" dirty="0">
+                <a:solidFill>
+                  <a:schemeClr val="bg1"/>
+                </a:solidFill>
+                <a:latin typeface="Arial"/>
+                <a:ea typeface="Arial"/>
+                <a:cs typeface="Arial"/>
+                <a:sym typeface="Arial"/>
+              </a:rPr>
+              <a:t>1</a:t>
+            </a:r>
+            <a:r>
+              <a:rPr lang="ko" sz="1200" b="1" i="0" u="none" strike="noStrike" cap="none" dirty="0">
+                <a:solidFill>
+                  <a:schemeClr val="bg1"/>
+                </a:solidFill>
+                <a:latin typeface="Arial"/>
+                <a:ea typeface="Arial"/>
+                <a:cs typeface="Arial"/>
+                <a:sym typeface="Arial"/>
+              </a:rPr>
+              <a:t>.</a:t>
+            </a:r>
+            <a:endParaRPr sz="500" dirty="0">
+              <a:solidFill>
+                <a:schemeClr val="bg1"/>
+              </a:solidFill>
+            </a:endParaRPr>
+          </a:p>
+        </p:txBody>
+      </p:sp>
+      <p:sp>
+        <p:nvSpPr>
+          <p:cNvPr id="8" name="Google Shape;210;p30">
+            <a:extLst>
+              <a:ext uri="{FF2B5EF4-FFF2-40B4-BE49-F238E27FC236}">
+                <a16:creationId xmlns:a16="http://schemas.microsoft.com/office/drawing/2014/main" id="{8CB63A74-B5C7-DCAA-53F5-96E44004D694}"/>
+              </a:ext>
+            </a:extLst>
+          </p:cNvPr>
+          <p:cNvSpPr/>
+          <p:nvPr/>
+        </p:nvSpPr>
+        <p:spPr>
+          <a:xfrm>
+            <a:off x="7811013" y="825047"/>
+            <a:ext cx="952500" cy="293400"/>
+          </a:xfrm>
+          <a:prstGeom prst="rect">
+            <a:avLst/>
+          </a:prstGeom>
+          <a:noFill/>
+          <a:ln>
+            <a:noFill/>
+          </a:ln>
+        </p:spPr>
+        <p:txBody>
+          <a:bodyPr spcFirstLastPara="1" wrap="square" lIns="19050" tIns="19050" rIns="19050" bIns="19050" anchor="t" anchorCtr="0">
+            <a:noAutofit/>
+          </a:bodyPr>
+          <a:lstStyle/>
+          <a:p>
+            <a:pPr marL="63500" marR="0" lvl="1" indent="0" algn="l" rtl="0">
+              <a:spcBef>
+                <a:spcPts val="200"/>
+              </a:spcBef>
+              <a:spcAft>
+                <a:spcPts val="0"/>
+              </a:spcAft>
+              <a:buClr>
+                <a:srgbClr val="000000"/>
+              </a:buClr>
+              <a:buFont typeface="Arial"/>
+              <a:buNone/>
+            </a:pPr>
+            <a:r>
+              <a:rPr lang="ko-KR" altLang="en-US" sz="800" dirty="0">
+                <a:solidFill>
+                  <a:schemeClr val="bg1"/>
+                </a:solidFill>
+              </a:rPr>
+              <a:t>소개 및 환경구성</a:t>
+            </a:r>
+            <a:endParaRPr sz="800" dirty="0">
+              <a:solidFill>
+                <a:schemeClr val="bg1"/>
+              </a:solidFill>
+            </a:endParaRPr>
+          </a:p>
+        </p:txBody>
+      </p:sp>
+      <p:sp>
+        <p:nvSpPr>
+          <p:cNvPr id="3" name="내용 개체 틀 3">
+            <a:extLst>
+              <a:ext uri="{FF2B5EF4-FFF2-40B4-BE49-F238E27FC236}">
+                <a16:creationId xmlns:a16="http://schemas.microsoft.com/office/drawing/2014/main" id="{E2AD104B-2F97-F7CA-8304-3CB479F80A39}"/>
+              </a:ext>
+            </a:extLst>
+          </p:cNvPr>
+          <p:cNvSpPr txBox="1">
+            <a:spLocks/>
+          </p:cNvSpPr>
+          <p:nvPr/>
+        </p:nvSpPr>
+        <p:spPr>
+          <a:xfrm>
+            <a:off x="4483806" y="1144200"/>
+            <a:ext cx="3943350" cy="3971924"/>
+          </a:xfrm>
+          <a:prstGeom prst="rect">
+            <a:avLst/>
+          </a:prstGeom>
+        </p:spPr>
+        <p:txBody>
+          <a:bodyPr vert="horz" lIns="91440" tIns="45720" rIns="91440" bIns="45720" rtlCol="0">
+            <a:normAutofit/>
+          </a:bodyPr>
+          <a:lstStyle>
+            <a:lvl1pPr marL="171450" indent="-171450" algn="l" defTabSz="685800" rtl="0" eaLnBrk="1" latinLnBrk="1" hangingPunct="1">
+              <a:lnSpc>
+                <a:spcPct val="150000"/>
+              </a:lnSpc>
+              <a:spcBef>
+                <a:spcPts val="750"/>
+              </a:spcBef>
+              <a:buFont typeface="Arial" panose="020B0604020202020204" pitchFamily="34" charset="0"/>
+              <a:buChar char="•"/>
+              <a:defRPr lang="ko-KR" altLang="en-US" sz="2100" kern="1200" dirty="0" smtClean="0">
+                <a:solidFill>
+                  <a:schemeClr val="tx1"/>
+                </a:solidFill>
+                <a:latin typeface="Spoqa Han Sans Neo Medium" pitchFamily="2" charset="-127"/>
+                <a:ea typeface="Spoqa Han Sans Neo Medium" pitchFamily="2" charset="-127"/>
+                <a:cs typeface="+mn-cs"/>
+              </a:defRPr>
+            </a:lvl1pPr>
+            <a:lvl2pPr marL="514350" indent="-171450" algn="l" defTabSz="685800" rtl="0" eaLnBrk="1" latinLnBrk="1" hangingPunct="1">
+              <a:lnSpc>
+                <a:spcPct val="150000"/>
+              </a:lnSpc>
+              <a:spcBef>
+                <a:spcPts val="375"/>
+              </a:spcBef>
+              <a:buFont typeface="Arial" panose="020B0604020202020204" pitchFamily="34" charset="0"/>
+              <a:buChar char="•"/>
+              <a:defRPr lang="ko-KR" altLang="en-US" sz="1800" kern="1200" dirty="0" smtClean="0">
+                <a:solidFill>
+                  <a:schemeClr val="tx1"/>
+                </a:solidFill>
+                <a:latin typeface="Spoqa Han Sans Neo Medium" pitchFamily="2" charset="-127"/>
+                <a:ea typeface="Spoqa Han Sans Neo Medium" pitchFamily="2" charset="-127"/>
+                <a:cs typeface="+mn-cs"/>
+              </a:defRPr>
+            </a:lvl2pPr>
+            <a:lvl3pPr marL="857250" indent="-171450" algn="l" defTabSz="685800" rtl="0" eaLnBrk="1" latinLnBrk="1" hangingPunct="1">
+              <a:lnSpc>
+                <a:spcPct val="150000"/>
+              </a:lnSpc>
+              <a:spcBef>
+                <a:spcPts val="375"/>
+              </a:spcBef>
+              <a:buFont typeface="Arial" panose="020B0604020202020204" pitchFamily="34" charset="0"/>
+              <a:buChar char="•"/>
+              <a:defRPr lang="ko-KR" altLang="en-US" sz="1500" kern="1200" dirty="0" smtClean="0">
+                <a:solidFill>
+                  <a:schemeClr val="tx1"/>
+                </a:solidFill>
+                <a:latin typeface="Spoqa Han Sans Neo Medium" pitchFamily="2" charset="-127"/>
+                <a:ea typeface="Spoqa Han Sans Neo Medium" pitchFamily="2" charset="-127"/>
+                <a:cs typeface="+mn-cs"/>
+              </a:defRPr>
+            </a:lvl3pPr>
+            <a:lvl4pPr marL="1200150" indent="-171450" algn="l" defTabSz="685800" rtl="0" eaLnBrk="1" latinLnBrk="1" hangingPunct="1">
+              <a:lnSpc>
+                <a:spcPct val="150000"/>
+              </a:lnSpc>
+              <a:spcBef>
+                <a:spcPts val="375"/>
+              </a:spcBef>
+              <a:buFont typeface="Arial" panose="020B0604020202020204" pitchFamily="34" charset="0"/>
+              <a:buChar char="•"/>
+              <a:defRPr lang="ko-KR" altLang="en-US" sz="1350" kern="1200" dirty="0" smtClean="0">
+                <a:solidFill>
+                  <a:schemeClr val="tx1"/>
+                </a:solidFill>
+                <a:latin typeface="Spoqa Han Sans Neo Medium" pitchFamily="2" charset="-127"/>
+                <a:ea typeface="Spoqa Han Sans Neo Medium" pitchFamily="2" charset="-127"/>
+                <a:cs typeface="+mn-cs"/>
+              </a:defRPr>
+            </a:lvl4pPr>
+            <a:lvl5pPr marL="1543050" indent="-171450" algn="l" defTabSz="685800" rtl="0" eaLnBrk="1" latinLnBrk="1" hangingPunct="1">
+              <a:lnSpc>
+                <a:spcPct val="150000"/>
+              </a:lnSpc>
+              <a:spcBef>
+                <a:spcPts val="375"/>
+              </a:spcBef>
+              <a:buFont typeface="Arial" panose="020B0604020202020204" pitchFamily="34" charset="0"/>
+              <a:buChar char="•"/>
+              <a:defRPr lang="en-US" altLang="en-US" sz="1350" kern="1200" dirty="0">
+                <a:solidFill>
+                  <a:schemeClr val="tx1"/>
+                </a:solidFill>
+                <a:latin typeface="Spoqa Han Sans Neo Medium" pitchFamily="2" charset="-127"/>
+                <a:ea typeface="Spoqa Han Sans Neo Medium" pitchFamily="2" charset="-127"/>
+                <a:cs typeface="+mn-cs"/>
+              </a:defRPr>
+            </a:lvl5pPr>
+            <a:lvl6pPr marL="1885950" indent="-171450" algn="l" defTabSz="685800" rtl="0" eaLnBrk="1" latinLnBrk="1" hangingPunct="1">
+              <a:lnSpc>
+                <a:spcPct val="90000"/>
+              </a:lnSpc>
+              <a:spcBef>
+                <a:spcPts val="375"/>
+              </a:spcBef>
+              <a:buFont typeface="Arial" panose="020B0604020202020204" pitchFamily="34" charset="0"/>
+              <a:buChar char="•"/>
+              <a:defRPr sz="1350" kern="1200">
+                <a:solidFill>
+                  <a:schemeClr val="tx1"/>
+                </a:solidFill>
+                <a:latin typeface="+mn-lt"/>
+                <a:ea typeface="+mn-ea"/>
+                <a:cs typeface="+mn-cs"/>
+              </a:defRPr>
+            </a:lvl6pPr>
+            <a:lvl7pPr marL="2228850" indent="-171450" algn="l" defTabSz="685800" rtl="0" eaLnBrk="1" latinLnBrk="1" hangingPunct="1">
+              <a:lnSpc>
+                <a:spcPct val="90000"/>
+              </a:lnSpc>
+              <a:spcBef>
+                <a:spcPts val="375"/>
+              </a:spcBef>
+              <a:buFont typeface="Arial" panose="020B0604020202020204" pitchFamily="34" charset="0"/>
+              <a:buChar char="•"/>
+              <a:defRPr sz="1350" kern="1200">
+                <a:solidFill>
+                  <a:schemeClr val="tx1"/>
+                </a:solidFill>
+                <a:latin typeface="+mn-lt"/>
+                <a:ea typeface="+mn-ea"/>
+                <a:cs typeface="+mn-cs"/>
+              </a:defRPr>
+            </a:lvl7pPr>
+            <a:lvl8pPr marL="2571750" indent="-171450" algn="l" defTabSz="685800" rtl="0" eaLnBrk="1" latinLnBrk="1" hangingPunct="1">
+              <a:lnSpc>
+                <a:spcPct val="90000"/>
+              </a:lnSpc>
+              <a:spcBef>
+                <a:spcPts val="375"/>
+              </a:spcBef>
+              <a:buFont typeface="Arial" panose="020B0604020202020204" pitchFamily="34" charset="0"/>
+              <a:buChar char="•"/>
+              <a:defRPr sz="1350" kern="1200">
+                <a:solidFill>
+                  <a:schemeClr val="tx1"/>
+                </a:solidFill>
+                <a:latin typeface="+mn-lt"/>
+                <a:ea typeface="+mn-ea"/>
+                <a:cs typeface="+mn-cs"/>
+              </a:defRPr>
+            </a:lvl8pPr>
+            <a:lvl9pPr marL="2914650" indent="-171450" algn="l" defTabSz="685800" rtl="0" eaLnBrk="1" latinLnBrk="1" hangingPunct="1">
+              <a:lnSpc>
+                <a:spcPct val="90000"/>
+              </a:lnSpc>
+              <a:spcBef>
+                <a:spcPts val="375"/>
+              </a:spcBef>
+              <a:buFont typeface="Arial" panose="020B0604020202020204" pitchFamily="34" charset="0"/>
+              <a:buChar char="•"/>
+              <a:defRPr sz="1350" kern="1200">
+                <a:solidFill>
+                  <a:schemeClr val="tx1"/>
+                </a:solidFill>
+                <a:latin typeface="+mn-lt"/>
+                <a:ea typeface="+mn-ea"/>
+                <a:cs typeface="+mn-cs"/>
+              </a:defRPr>
+            </a:lvl9pPr>
+          </a:lstStyle>
+          <a:p>
+            <a:pPr marL="0" indent="0">
+              <a:buFont typeface="Arial" panose="020B0604020202020204" pitchFamily="34" charset="0"/>
+              <a:buNone/>
+            </a:pPr>
+            <a:r>
+              <a:rPr lang="ko-KR" altLang="en-US" dirty="0"/>
+              <a:t>단점</a:t>
+            </a:r>
+          </a:p>
+          <a:p>
+            <a:pPr lvl="1"/>
+            <a:r>
+              <a:rPr lang="en-US" altLang="ko-KR" dirty="0"/>
+              <a:t>Reactor </a:t>
+            </a:r>
+            <a:r>
+              <a:rPr lang="ko-KR" altLang="en-US" dirty="0"/>
+              <a:t>구현 난이도</a:t>
+            </a:r>
+          </a:p>
+        </p:txBody>
+      </p:sp>
+    </p:spTree>
+    <p:extLst>
+      <p:ext uri="{BB962C8B-B14F-4D97-AF65-F5344CB8AC3E}">
+        <p14:creationId xmlns:p14="http://schemas.microsoft.com/office/powerpoint/2010/main" val="1656187413"/>
+      </p:ext>
+    </p:extLst>
+  </p:cSld>
+  <p:clrMapOvr>
+    <a:masterClrMapping/>
+  </p:clrMapOvr>
+</p:sld>
+</file>
+
+<file path=ppt/slides/slide5.xml><?xml version="1.0" encoding="utf-8"?>
+<p:sld xmlns:a="http://schemas.openxmlformats.org/drawingml/2006/main" xmlns:r="http://schemas.openxmlformats.org/officeDocument/2006/relationships" xmlns:p="http://schemas.openxmlformats.org/presentationml/2006/main">
+  <p:cSld>
+    <p:spTree>
+      <p:nvGrpSpPr>
+        <p:cNvPr id="1" name=""/>
+        <p:cNvGrpSpPr/>
+        <p:nvPr/>
+      </p:nvGrpSpPr>
+      <p:grpSpPr>
+        <a:xfrm>
+          <a:off x="0" y="0"/>
+          <a:ext cx="0" cy="0"/>
+          <a:chOff x="0" y="0"/>
+          <a:chExt cx="0" cy="0"/>
+        </a:xfrm>
+      </p:grpSpPr>
+      <p:sp>
+        <p:nvSpPr>
+          <p:cNvPr id="2" name="제목 1">
+            <a:extLst>
+              <a:ext uri="{FF2B5EF4-FFF2-40B4-BE49-F238E27FC236}">
+                <a16:creationId xmlns:a16="http://schemas.microsoft.com/office/drawing/2014/main" id="{D21C1AA9-5E52-3A11-B3B3-447787E29D09}"/>
+              </a:ext>
+            </a:extLst>
+          </p:cNvPr>
+          <p:cNvSpPr>
+            <a:spLocks noGrp="1"/>
+          </p:cNvSpPr>
+          <p:nvPr>
+            <p:ph type="title"/>
+          </p:nvPr>
+        </p:nvSpPr>
+        <p:spPr/>
+        <p:txBody>
+          <a:bodyPr/>
+          <a:lstStyle/>
+          <a:p>
+            <a:r>
+              <a:rPr lang="ko-KR" altLang="en-US" dirty="0"/>
+              <a:t>구현내용 및 개발환경 구성</a:t>
+            </a:r>
+          </a:p>
+        </p:txBody>
+      </p:sp>
+      <p:sp>
+        <p:nvSpPr>
           <p:cNvPr id="7" name="Google Shape;209;p30">
             <a:extLst>
               <a:ext uri="{FF2B5EF4-FFF2-40B4-BE49-F238E27FC236}">
@@ -6278,7 +7112,7 @@
 </p:sld>
 </file>
 
-<file path=ppt/slides/slide5.xml><?xml version="1.0" encoding="utf-8"?>
+<file path=ppt/slides/slide6.xml><?xml version="1.0" encoding="utf-8"?>
 <p:sld xmlns:a="http://schemas.openxmlformats.org/drawingml/2006/main" xmlns:r="http://schemas.openxmlformats.org/officeDocument/2006/relationships" xmlns:p="http://schemas.openxmlformats.org/presentationml/2006/main">
   <p:cSld>
     <p:spTree>
@@ -6528,7 +7362,7 @@
 </p:sld>
 </file>
 
-<file path=ppt/slides/slide6.xml><?xml version="1.0" encoding="utf-8"?>
+<file path=ppt/slides/slide7.xml><?xml version="1.0" encoding="utf-8"?>
 <p:sld xmlns:a="http://schemas.openxmlformats.org/drawingml/2006/main" xmlns:r="http://schemas.openxmlformats.org/officeDocument/2006/relationships" xmlns:p="http://schemas.openxmlformats.org/presentationml/2006/main">
   <p:cSld>
     <p:spTree>
@@ -8145,326 +8979,6 @@
 </p:sld>
 </file>
 
-<file path=ppt/slides/slide7.xml><?xml version="1.0" encoding="utf-8"?>
-<p:sld xmlns:a="http://schemas.openxmlformats.org/drawingml/2006/main" xmlns:r="http://schemas.openxmlformats.org/officeDocument/2006/relationships" xmlns:p="http://schemas.openxmlformats.org/presentationml/2006/main">
-  <p:cSld>
-    <p:spTree>
-      <p:nvGrpSpPr>
-        <p:cNvPr id="1" name=""/>
-        <p:cNvGrpSpPr/>
-        <p:nvPr/>
-      </p:nvGrpSpPr>
-      <p:grpSpPr>
-        <a:xfrm>
-          <a:off x="0" y="0"/>
-          <a:ext cx="0" cy="0"/>
-          <a:chOff x="0" y="0"/>
-          <a:chExt cx="0" cy="0"/>
-        </a:xfrm>
-      </p:grpSpPr>
-      <p:sp>
-        <p:nvSpPr>
-          <p:cNvPr id="2" name="제목 1">
-            <a:extLst>
-              <a:ext uri="{FF2B5EF4-FFF2-40B4-BE49-F238E27FC236}">
-                <a16:creationId xmlns:a16="http://schemas.microsoft.com/office/drawing/2014/main" id="{D21C1AA9-5E52-3A11-B3B3-447787E29D09}"/>
-              </a:ext>
-            </a:extLst>
-          </p:cNvPr>
-          <p:cNvSpPr>
-            <a:spLocks noGrp="1"/>
-          </p:cNvSpPr>
-          <p:nvPr>
-            <p:ph type="title"/>
-          </p:nvPr>
-        </p:nvSpPr>
-        <p:spPr/>
-        <p:txBody>
-          <a:bodyPr/>
-          <a:lstStyle/>
-          <a:p>
-            <a:r>
-              <a:rPr lang="ko-KR" altLang="en-US" dirty="0"/>
-              <a:t>구현내용 및 개발환경 구성</a:t>
-            </a:r>
-          </a:p>
-        </p:txBody>
-      </p:sp>
-      <p:sp>
-        <p:nvSpPr>
-          <p:cNvPr id="4" name="내용 개체 틀 3">
-            <a:extLst>
-              <a:ext uri="{FF2B5EF4-FFF2-40B4-BE49-F238E27FC236}">
-                <a16:creationId xmlns:a16="http://schemas.microsoft.com/office/drawing/2014/main" id="{42F6317C-F28B-ECBE-0810-17736FC7D8AB}"/>
-              </a:ext>
-            </a:extLst>
-          </p:cNvPr>
-          <p:cNvSpPr>
-            <a:spLocks noGrp="1"/>
-          </p:cNvSpPr>
-          <p:nvPr>
-            <p:ph idx="1"/>
-          </p:nvPr>
-        </p:nvSpPr>
-        <p:spPr/>
-        <p:txBody>
-          <a:bodyPr>
-            <a:normAutofit lnSpcReduction="10000"/>
-          </a:bodyPr>
-          <a:lstStyle/>
-          <a:p>
-            <a:pPr marL="0" indent="0">
-              <a:buNone/>
-            </a:pPr>
-            <a:r>
-              <a:rPr lang="en-US" altLang="ko-KR" dirty="0"/>
-              <a:t>Reactor</a:t>
-            </a:r>
-          </a:p>
-          <a:p>
-            <a:pPr lvl="1"/>
-            <a:r>
-              <a:rPr lang="en-US" altLang="ko-KR" dirty="0"/>
-              <a:t>JVM</a:t>
-            </a:r>
-            <a:r>
-              <a:rPr lang="ko-KR" altLang="en-US" dirty="0"/>
-              <a:t>에서 </a:t>
-            </a:r>
-            <a:r>
-              <a:rPr lang="en-US" altLang="ko-KR" dirty="0"/>
-              <a:t>Async NIO </a:t>
-            </a:r>
-            <a:r>
-              <a:rPr lang="ko-KR" altLang="en-US" dirty="0"/>
-              <a:t>어플리케이션을 구축하기 위한 프레임워크</a:t>
-            </a:r>
-            <a:endParaRPr lang="en-US" altLang="ko-KR" dirty="0"/>
-          </a:p>
-          <a:p>
-            <a:pPr lvl="1"/>
-            <a:r>
-              <a:rPr lang="ko-KR" altLang="en-US" dirty="0"/>
-              <a:t>처음에는 대용량 데이터 스트리밍 처리를 목적으로 개발</a:t>
-            </a:r>
-            <a:endParaRPr lang="en-US" altLang="ko-KR" dirty="0"/>
-          </a:p>
-          <a:p>
-            <a:pPr lvl="1"/>
-            <a:r>
-              <a:rPr lang="en-US" altLang="ko-KR" dirty="0"/>
-              <a:t>Reactive Streams </a:t>
-            </a:r>
-            <a:r>
-              <a:rPr lang="ko-KR" altLang="en-US" dirty="0"/>
-              <a:t>란 비동기 스트림 처리표준 구현</a:t>
-            </a:r>
-            <a:endParaRPr lang="en-US" altLang="ko-KR" dirty="0"/>
-          </a:p>
-          <a:p>
-            <a:pPr lvl="2"/>
-            <a:r>
-              <a:rPr lang="en-US" altLang="ko-KR" dirty="0">
-                <a:effectLst/>
-                <a:hlinkClick r:id="rId3"/>
-              </a:rPr>
-              <a:t>http://www.reactive-streams.org</a:t>
-            </a:r>
-            <a:endParaRPr lang="en-US" altLang="ko-KR" dirty="0">
-              <a:effectLst/>
-            </a:endParaRPr>
-          </a:p>
-          <a:p>
-            <a:pPr lvl="2"/>
-            <a:r>
-              <a:rPr lang="en-US" altLang="ko-KR" dirty="0"/>
-              <a:t>Java9 Flow</a:t>
-            </a:r>
-            <a:r>
-              <a:rPr lang="ko-KR" altLang="en-US" dirty="0"/>
-              <a:t>도 해당 표준을 따르고 있음</a:t>
-            </a:r>
-            <a:endParaRPr lang="en-US" altLang="ko-KR" dirty="0"/>
-          </a:p>
-          <a:p>
-            <a:pPr lvl="1"/>
-            <a:r>
-              <a:rPr lang="en-US" altLang="ko-KR" dirty="0"/>
-              <a:t>Release</a:t>
-            </a:r>
-          </a:p>
-          <a:p>
-            <a:pPr lvl="2"/>
-            <a:r>
-              <a:rPr lang="en-US" altLang="ko-KR" dirty="0"/>
-              <a:t>1.0 : 2013.07</a:t>
-            </a:r>
-          </a:p>
-          <a:p>
-            <a:pPr lvl="2"/>
-            <a:r>
-              <a:rPr lang="en-US" altLang="ko-KR" dirty="0"/>
-              <a:t>3.0 : 2016.08</a:t>
-            </a:r>
-          </a:p>
-          <a:p>
-            <a:pPr lvl="1"/>
-            <a:endParaRPr lang="en-US" altLang="ko-KR" dirty="0"/>
-          </a:p>
-          <a:p>
-            <a:pPr lvl="1"/>
-            <a:endParaRPr lang="en-US" altLang="ko-KR" dirty="0"/>
-          </a:p>
-        </p:txBody>
-      </p:sp>
-      <p:sp>
-        <p:nvSpPr>
-          <p:cNvPr id="7" name="Google Shape;209;p30">
-            <a:extLst>
-              <a:ext uri="{FF2B5EF4-FFF2-40B4-BE49-F238E27FC236}">
-                <a16:creationId xmlns:a16="http://schemas.microsoft.com/office/drawing/2014/main" id="{35F3E219-4EBB-8DE8-0966-E4317399395E}"/>
-              </a:ext>
-            </a:extLst>
-          </p:cNvPr>
-          <p:cNvSpPr/>
-          <p:nvPr/>
-        </p:nvSpPr>
-        <p:spPr>
-          <a:xfrm>
-            <a:off x="7811013" y="528014"/>
-            <a:ext cx="952500" cy="298200"/>
-          </a:xfrm>
-          <a:prstGeom prst="rect">
-            <a:avLst/>
-          </a:prstGeom>
-          <a:noFill/>
-          <a:ln>
-            <a:noFill/>
-          </a:ln>
-        </p:spPr>
-        <p:txBody>
-          <a:bodyPr spcFirstLastPara="1" wrap="square" lIns="19050" tIns="19050" rIns="19050" bIns="19050" anchor="t" anchorCtr="0">
-            <a:noAutofit/>
-          </a:bodyPr>
-          <a:lstStyle/>
-          <a:p>
-            <a:pPr marL="63500" marR="0" lvl="1" indent="0" algn="l" rtl="0">
-              <a:lnSpc>
-                <a:spcPct val="90000"/>
-              </a:lnSpc>
-              <a:spcBef>
-                <a:spcPts val="0"/>
-              </a:spcBef>
-              <a:spcAft>
-                <a:spcPts val="0"/>
-              </a:spcAft>
-              <a:buNone/>
-            </a:pPr>
-            <a:r>
-              <a:rPr lang="en-US" altLang="ko" sz="1200" b="1" i="0" u="none" strike="noStrike" cap="none" dirty="0">
-                <a:solidFill>
-                  <a:schemeClr val="bg1"/>
-                </a:solidFill>
-                <a:latin typeface="Arial"/>
-                <a:ea typeface="Arial"/>
-                <a:cs typeface="Arial"/>
-                <a:sym typeface="Arial"/>
-              </a:rPr>
-              <a:t>1</a:t>
-            </a:r>
-            <a:r>
-              <a:rPr lang="ko" sz="1200" b="1" i="0" u="none" strike="noStrike" cap="none" dirty="0">
-                <a:solidFill>
-                  <a:schemeClr val="bg1"/>
-                </a:solidFill>
-                <a:latin typeface="Arial"/>
-                <a:ea typeface="Arial"/>
-                <a:cs typeface="Arial"/>
-                <a:sym typeface="Arial"/>
-              </a:rPr>
-              <a:t>.</a:t>
-            </a:r>
-            <a:endParaRPr sz="500" dirty="0">
-              <a:solidFill>
-                <a:schemeClr val="bg1"/>
-              </a:solidFill>
-            </a:endParaRPr>
-          </a:p>
-        </p:txBody>
-      </p:sp>
-      <p:sp>
-        <p:nvSpPr>
-          <p:cNvPr id="8" name="Google Shape;210;p30">
-            <a:extLst>
-              <a:ext uri="{FF2B5EF4-FFF2-40B4-BE49-F238E27FC236}">
-                <a16:creationId xmlns:a16="http://schemas.microsoft.com/office/drawing/2014/main" id="{8CB63A74-B5C7-DCAA-53F5-96E44004D694}"/>
-              </a:ext>
-            </a:extLst>
-          </p:cNvPr>
-          <p:cNvSpPr/>
-          <p:nvPr/>
-        </p:nvSpPr>
-        <p:spPr>
-          <a:xfrm>
-            <a:off x="7811013" y="825047"/>
-            <a:ext cx="952500" cy="293400"/>
-          </a:xfrm>
-          <a:prstGeom prst="rect">
-            <a:avLst/>
-          </a:prstGeom>
-          <a:noFill/>
-          <a:ln>
-            <a:noFill/>
-          </a:ln>
-        </p:spPr>
-        <p:txBody>
-          <a:bodyPr spcFirstLastPara="1" wrap="square" lIns="19050" tIns="19050" rIns="19050" bIns="19050" anchor="t" anchorCtr="0">
-            <a:noAutofit/>
-          </a:bodyPr>
-          <a:lstStyle/>
-          <a:p>
-            <a:pPr marL="63500" marR="0" lvl="1" indent="0" algn="l" rtl="0">
-              <a:spcBef>
-                <a:spcPts val="200"/>
-              </a:spcBef>
-              <a:spcAft>
-                <a:spcPts val="0"/>
-              </a:spcAft>
-              <a:buClr>
-                <a:srgbClr val="000000"/>
-              </a:buClr>
-              <a:buFont typeface="Arial"/>
-              <a:buNone/>
-            </a:pPr>
-            <a:r>
-              <a:rPr lang="ko-KR" altLang="en-US" sz="800" dirty="0">
-                <a:solidFill>
-                  <a:schemeClr val="bg1"/>
-                </a:solidFill>
-              </a:rPr>
-              <a:t>소개 및 환경구성</a:t>
-            </a:r>
-            <a:endParaRPr sz="800" dirty="0">
-              <a:solidFill>
-                <a:schemeClr val="bg1"/>
-              </a:solidFill>
-            </a:endParaRPr>
-          </a:p>
-        </p:txBody>
-      </p:sp>
-    </p:spTree>
-    <p:extLst>
-      <p:ext uri="{BB962C8B-B14F-4D97-AF65-F5344CB8AC3E}">
-        <p14:creationId xmlns:p14="http://schemas.microsoft.com/office/powerpoint/2010/main" val="965742696"/>
-      </p:ext>
-    </p:extLst>
-  </p:cSld>
-  <p:clrMapOvr>
-    <a:masterClrMapping/>
-  </p:clrMapOvr>
-</p:sld>
-</file>
-
 <file path=ppt/slides/slide8.xml><?xml version="1.0" encoding="utf-8"?>
 <p:sld xmlns:a="http://schemas.openxmlformats.org/drawingml/2006/main" xmlns:r="http://schemas.openxmlformats.org/officeDocument/2006/relationships" xmlns:p="http://schemas.openxmlformats.org/presentationml/2006/main">
   <p:cSld>
@@ -8484,10 +8998,10 @@
       </p:grpSpPr>
       <p:sp>
         <p:nvSpPr>
-          <p:cNvPr id="4" name="제목 3">
+          <p:cNvPr id="2" name="제목 1">
             <a:extLst>
               <a:ext uri="{FF2B5EF4-FFF2-40B4-BE49-F238E27FC236}">
-                <a16:creationId xmlns:a16="http://schemas.microsoft.com/office/drawing/2014/main" id="{D283F7C5-AF5C-DEEF-FC15-4B59CEF592DE}"/>
+                <a16:creationId xmlns:a16="http://schemas.microsoft.com/office/drawing/2014/main" id="{D21C1AA9-5E52-3A11-B3B3-447787E29D09}"/>
               </a:ext>
             </a:extLst>
           </p:cNvPr>
@@ -8495,7 +9009,7 @@
             <a:spLocks noGrp="1"/>
           </p:cNvSpPr>
           <p:nvPr>
-            <p:ph type="ctrTitle"/>
+            <p:ph type="title"/>
           </p:nvPr>
         </p:nvSpPr>
         <p:spPr/>
@@ -8505,17 +9019,17 @@
           <a:p>
             <a:r>
               <a:rPr lang="ko-KR" altLang="en-US" dirty="0"/>
-              <a:t>구현 실습</a:t>
-            </a:r>
-          </a:p>
-        </p:txBody>
-      </p:sp>
-      <p:sp>
-        <p:nvSpPr>
-          <p:cNvPr id="5" name="부제목 4">
+              <a:t>구현내용 및 개발환경 구성</a:t>
+            </a:r>
+          </a:p>
+        </p:txBody>
+      </p:sp>
+      <p:sp>
+        <p:nvSpPr>
+          <p:cNvPr id="4" name="내용 개체 틀 3">
             <a:extLst>
               <a:ext uri="{FF2B5EF4-FFF2-40B4-BE49-F238E27FC236}">
-                <a16:creationId xmlns:a16="http://schemas.microsoft.com/office/drawing/2014/main" id="{C884C73A-BBA1-E6A6-DDF5-9A946E28E963}"/>
+                <a16:creationId xmlns:a16="http://schemas.microsoft.com/office/drawing/2014/main" id="{42F6317C-F28B-ECBE-0810-17736FC7D8AB}"/>
               </a:ext>
             </a:extLst>
           </p:cNvPr>
@@ -8523,29 +9037,259 @@
             <a:spLocks noGrp="1"/>
           </p:cNvSpPr>
           <p:nvPr>
-            <p:ph type="subTitle" idx="1"/>
+            <p:ph idx="1"/>
           </p:nvPr>
         </p:nvSpPr>
         <p:spPr/>
         <p:txBody>
-          <a:bodyPr/>
+          <a:bodyPr>
+            <a:normAutofit lnSpcReduction="10000"/>
+          </a:bodyPr>
           <a:lstStyle/>
           <a:p>
-            <a:pPr marL="0" indent="0" algn="r">
+            <a:pPr marL="0" indent="0">
               <a:buNone/>
             </a:pPr>
             <a:r>
               <a:rPr lang="en-US" altLang="ko-KR" dirty="0"/>
-              <a:t>Hello Reactor</a:t>
-            </a:r>
-            <a:endParaRPr lang="ko-KR" altLang="en-US" dirty="0"/>
+              <a:t>Reactor</a:t>
+            </a:r>
+          </a:p>
+          <a:p>
+            <a:pPr lvl="1"/>
+            <a:r>
+              <a:rPr lang="en-US" altLang="ko-KR" dirty="0"/>
+              <a:t>JVM</a:t>
+            </a:r>
+            <a:r>
+              <a:rPr lang="ko-KR" altLang="en-US" dirty="0"/>
+              <a:t>에서 </a:t>
+            </a:r>
+            <a:r>
+              <a:rPr lang="en-US" altLang="ko-KR" dirty="0"/>
+              <a:t>Async NIO </a:t>
+            </a:r>
+            <a:r>
+              <a:rPr lang="ko-KR" altLang="en-US" dirty="0"/>
+              <a:t>어플리케이션을 구축하기 위한 프레임워크</a:t>
+            </a:r>
+            <a:endParaRPr lang="en-US" altLang="ko-KR" dirty="0"/>
+          </a:p>
+          <a:p>
+            <a:pPr lvl="1"/>
+            <a:r>
+              <a:rPr lang="ko-KR" altLang="en-US" dirty="0"/>
+              <a:t>처음에는 대용량 데이터 스트리밍 처리를 목적으로 개발</a:t>
+            </a:r>
+            <a:endParaRPr lang="en-US" altLang="ko-KR" dirty="0"/>
+          </a:p>
+          <a:p>
+            <a:pPr lvl="1"/>
+            <a:r>
+              <a:rPr lang="en-US" altLang="ko-KR" dirty="0"/>
+              <a:t>Reactive Streams </a:t>
+            </a:r>
+            <a:r>
+              <a:rPr lang="ko-KR" altLang="en-US" dirty="0"/>
+              <a:t>란 비동기 스트림 처리표준 구현</a:t>
+            </a:r>
+            <a:endParaRPr lang="en-US" altLang="ko-KR" dirty="0"/>
+          </a:p>
+          <a:p>
+            <a:pPr lvl="2"/>
+            <a:r>
+              <a:rPr lang="en-US" altLang="ko-KR" dirty="0">
+                <a:effectLst/>
+                <a:hlinkClick r:id="rId3"/>
+              </a:rPr>
+              <a:t>http://www.reactive-streams.org</a:t>
+            </a:r>
+            <a:endParaRPr lang="en-US" altLang="ko-KR" dirty="0">
+              <a:effectLst/>
+            </a:endParaRPr>
+          </a:p>
+          <a:p>
+            <a:pPr lvl="2"/>
+            <a:r>
+              <a:rPr lang="en-US" altLang="ko-KR" dirty="0"/>
+              <a:t>Java9 Flow</a:t>
+            </a:r>
+            <a:r>
+              <a:rPr lang="ko-KR" altLang="en-US" dirty="0"/>
+              <a:t>도 해당 표준을 따르고 있음</a:t>
+            </a:r>
+            <a:endParaRPr lang="en-US" altLang="ko-KR" dirty="0"/>
+          </a:p>
+          <a:p>
+            <a:pPr lvl="1"/>
+            <a:r>
+              <a:rPr lang="en-US" altLang="ko-KR" dirty="0"/>
+              <a:t>Release</a:t>
+            </a:r>
+          </a:p>
+          <a:p>
+            <a:pPr lvl="2"/>
+            <a:r>
+              <a:rPr lang="en-US" altLang="ko-KR" dirty="0"/>
+              <a:t>1.0 : 2013.07</a:t>
+            </a:r>
+          </a:p>
+          <a:p>
+            <a:pPr lvl="2"/>
+            <a:r>
+              <a:rPr lang="en-US" altLang="ko-KR" dirty="0"/>
+              <a:t>3.0 : 2016.08</a:t>
+            </a:r>
+          </a:p>
+          <a:p>
+            <a:pPr lvl="1"/>
+            <a:endParaRPr lang="en-US" altLang="ko-KR" dirty="0"/>
+          </a:p>
+          <a:p>
+            <a:pPr lvl="1"/>
+            <a:endParaRPr lang="en-US" altLang="ko-KR" dirty="0"/>
+          </a:p>
+        </p:txBody>
+      </p:sp>
+      <p:sp>
+        <p:nvSpPr>
+          <p:cNvPr id="7" name="Google Shape;209;p30">
+            <a:extLst>
+              <a:ext uri="{FF2B5EF4-FFF2-40B4-BE49-F238E27FC236}">
+                <a16:creationId xmlns:a16="http://schemas.microsoft.com/office/drawing/2014/main" id="{35F3E219-4EBB-8DE8-0966-E4317399395E}"/>
+              </a:ext>
+            </a:extLst>
+          </p:cNvPr>
+          <p:cNvSpPr/>
+          <p:nvPr/>
+        </p:nvSpPr>
+        <p:spPr>
+          <a:xfrm>
+            <a:off x="7811013" y="528014"/>
+            <a:ext cx="952500" cy="298200"/>
+          </a:xfrm>
+          <a:prstGeom prst="rect">
+            <a:avLst/>
+          </a:prstGeom>
+          <a:noFill/>
+          <a:ln>
+            <a:noFill/>
+          </a:ln>
+        </p:spPr>
+        <p:txBody>
+          <a:bodyPr spcFirstLastPara="1" wrap="square" lIns="19050" tIns="19050" rIns="19050" bIns="19050" anchor="t" anchorCtr="0">
+            <a:noAutofit/>
+          </a:bodyPr>
+          <a:lstStyle/>
+          <a:p>
+            <a:pPr marL="63500" marR="0" lvl="1" indent="0" algn="l" rtl="0">
+              <a:lnSpc>
+                <a:spcPct val="90000"/>
+              </a:lnSpc>
+              <a:spcBef>
+                <a:spcPts val="0"/>
+              </a:spcBef>
+              <a:spcAft>
+                <a:spcPts val="0"/>
+              </a:spcAft>
+              <a:buNone/>
+            </a:pPr>
+            <a:r>
+              <a:rPr lang="en-US" altLang="ko" sz="1200" b="1" i="0" u="none" strike="noStrike" cap="none" dirty="0">
+                <a:solidFill>
+                  <a:schemeClr val="bg1"/>
+                </a:solidFill>
+                <a:latin typeface="Arial"/>
+                <a:ea typeface="Arial"/>
+                <a:cs typeface="Arial"/>
+                <a:sym typeface="Arial"/>
+              </a:rPr>
+              <a:t>1</a:t>
+            </a:r>
+            <a:r>
+              <a:rPr lang="ko" sz="1200" b="1" i="0" u="none" strike="noStrike" cap="none" dirty="0">
+                <a:solidFill>
+                  <a:schemeClr val="bg1"/>
+                </a:solidFill>
+                <a:latin typeface="Arial"/>
+                <a:ea typeface="Arial"/>
+                <a:cs typeface="Arial"/>
+                <a:sym typeface="Arial"/>
+              </a:rPr>
+              <a:t>.</a:t>
+            </a:r>
+            <a:endParaRPr sz="500" dirty="0">
+              <a:solidFill>
+                <a:schemeClr val="bg1"/>
+              </a:solidFill>
+            </a:endParaRPr>
+          </a:p>
+        </p:txBody>
+      </p:sp>
+      <p:sp>
+        <p:nvSpPr>
+          <p:cNvPr id="8" name="Google Shape;210;p30">
+            <a:extLst>
+              <a:ext uri="{FF2B5EF4-FFF2-40B4-BE49-F238E27FC236}">
+                <a16:creationId xmlns:a16="http://schemas.microsoft.com/office/drawing/2014/main" id="{8CB63A74-B5C7-DCAA-53F5-96E44004D694}"/>
+              </a:ext>
+            </a:extLst>
+          </p:cNvPr>
+          <p:cNvSpPr/>
+          <p:nvPr/>
+        </p:nvSpPr>
+        <p:spPr>
+          <a:xfrm>
+            <a:off x="7811013" y="825047"/>
+            <a:ext cx="952500" cy="293400"/>
+          </a:xfrm>
+          <a:prstGeom prst="rect">
+            <a:avLst/>
+          </a:prstGeom>
+          <a:noFill/>
+          <a:ln>
+            <a:noFill/>
+          </a:ln>
+        </p:spPr>
+        <p:txBody>
+          <a:bodyPr spcFirstLastPara="1" wrap="square" lIns="19050" tIns="19050" rIns="19050" bIns="19050" anchor="t" anchorCtr="0">
+            <a:noAutofit/>
+          </a:bodyPr>
+          <a:lstStyle/>
+          <a:p>
+            <a:pPr marL="63500" marR="0" lvl="1" indent="0" algn="l" rtl="0">
+              <a:spcBef>
+                <a:spcPts val="200"/>
+              </a:spcBef>
+              <a:spcAft>
+                <a:spcPts val="0"/>
+              </a:spcAft>
+              <a:buClr>
+                <a:srgbClr val="000000"/>
+              </a:buClr>
+              <a:buFont typeface="Arial"/>
+              <a:buNone/>
+            </a:pPr>
+            <a:r>
+              <a:rPr lang="ko-KR" altLang="en-US" sz="800" dirty="0">
+                <a:solidFill>
+                  <a:schemeClr val="bg1"/>
+                </a:solidFill>
+              </a:rPr>
+              <a:t>소개 및 환경구성</a:t>
+            </a:r>
+            <a:endParaRPr sz="800" dirty="0">
+              <a:solidFill>
+                <a:schemeClr val="bg1"/>
+              </a:solidFill>
+            </a:endParaRPr>
           </a:p>
         </p:txBody>
       </p:sp>
     </p:spTree>
     <p:extLst>
       <p:ext uri="{BB962C8B-B14F-4D97-AF65-F5344CB8AC3E}">
-        <p14:creationId xmlns:p14="http://schemas.microsoft.com/office/powerpoint/2010/main" val="3012872894"/>
+        <p14:creationId xmlns:p14="http://schemas.microsoft.com/office/powerpoint/2010/main" val="965742696"/>
       </p:ext>
     </p:extLst>
   </p:cSld>
@@ -8574,10 +9318,10 @@
       </p:grpSpPr>
       <p:sp>
         <p:nvSpPr>
-          <p:cNvPr id="2" name="제목 1">
+          <p:cNvPr id="4" name="제목 3">
             <a:extLst>
               <a:ext uri="{FF2B5EF4-FFF2-40B4-BE49-F238E27FC236}">
-                <a16:creationId xmlns:a16="http://schemas.microsoft.com/office/drawing/2014/main" id="{D21C1AA9-5E52-3A11-B3B3-447787E29D09}"/>
+                <a16:creationId xmlns:a16="http://schemas.microsoft.com/office/drawing/2014/main" id="{D283F7C5-AF5C-DEEF-FC15-4B59CEF592DE}"/>
               </a:ext>
             </a:extLst>
           </p:cNvPr>
@@ -8585,7 +9329,7 @@
             <a:spLocks noGrp="1"/>
           </p:cNvSpPr>
           <p:nvPr>
-            <p:ph type="title"/>
+            <p:ph type="ctrTitle"/>
           </p:nvPr>
         </p:nvSpPr>
         <p:spPr/>
@@ -8595,17 +9339,17 @@
           <a:p>
             <a:r>
               <a:rPr lang="ko-KR" altLang="en-US" dirty="0"/>
-              <a:t>구현내용 및 개발환경 구성</a:t>
-            </a:r>
-          </a:p>
-        </p:txBody>
-      </p:sp>
-      <p:sp>
-        <p:nvSpPr>
-          <p:cNvPr id="4" name="내용 개체 틀 3">
+              <a:t>구현 실습</a:t>
+            </a:r>
+          </a:p>
+        </p:txBody>
+      </p:sp>
+      <p:sp>
+        <p:nvSpPr>
+          <p:cNvPr id="5" name="부제목 4">
             <a:extLst>
               <a:ext uri="{FF2B5EF4-FFF2-40B4-BE49-F238E27FC236}">
-                <a16:creationId xmlns:a16="http://schemas.microsoft.com/office/drawing/2014/main" id="{42F6317C-F28B-ECBE-0810-17736FC7D8AB}"/>
+                <a16:creationId xmlns:a16="http://schemas.microsoft.com/office/drawing/2014/main" id="{C884C73A-BBA1-E6A6-DDF5-9A946E28E963}"/>
               </a:ext>
             </a:extLst>
           </p:cNvPr>
@@ -8613,7 +9357,7 @@
             <a:spLocks noGrp="1"/>
           </p:cNvSpPr>
           <p:nvPr>
-            <p:ph idx="1"/>
+            <p:ph type="subTitle" idx="1"/>
           </p:nvPr>
         </p:nvSpPr>
         <p:spPr/>
@@ -8621,296 +9365,21 @@
           <a:bodyPr/>
           <a:lstStyle/>
           <a:p>
-            <a:pPr marL="0" indent="0">
+            <a:pPr marL="0" indent="0" algn="r">
               <a:buNone/>
             </a:pPr>
             <a:r>
-              <a:rPr lang="ko-KR" altLang="en-US" dirty="0"/>
-              <a:t>구현내용</a:t>
-            </a:r>
-            <a:endParaRPr lang="en-US" altLang="ko-KR" dirty="0"/>
-          </a:p>
-        </p:txBody>
-      </p:sp>
-      <p:sp>
-        <p:nvSpPr>
-          <p:cNvPr id="7" name="Google Shape;209;p30">
-            <a:extLst>
-              <a:ext uri="{FF2B5EF4-FFF2-40B4-BE49-F238E27FC236}">
-                <a16:creationId xmlns:a16="http://schemas.microsoft.com/office/drawing/2014/main" id="{35F3E219-4EBB-8DE8-0966-E4317399395E}"/>
-              </a:ext>
-            </a:extLst>
-          </p:cNvPr>
-          <p:cNvSpPr/>
-          <p:nvPr/>
-        </p:nvSpPr>
-        <p:spPr>
-          <a:xfrm>
-            <a:off x="7811013" y="528014"/>
-            <a:ext cx="952500" cy="298200"/>
-          </a:xfrm>
-          <a:prstGeom prst="rect">
-            <a:avLst/>
-          </a:prstGeom>
-          <a:noFill/>
-          <a:ln>
-            <a:noFill/>
-          </a:ln>
-        </p:spPr>
-        <p:txBody>
-          <a:bodyPr spcFirstLastPara="1" wrap="square" lIns="19050" tIns="19050" rIns="19050" bIns="19050" anchor="t" anchorCtr="0">
-            <a:noAutofit/>
-          </a:bodyPr>
-          <a:lstStyle/>
-          <a:p>
-            <a:pPr marL="63500" marR="0" lvl="1" indent="0" algn="l" rtl="0">
-              <a:lnSpc>
-                <a:spcPct val="90000"/>
-              </a:lnSpc>
-              <a:spcBef>
-                <a:spcPts val="0"/>
-              </a:spcBef>
-              <a:spcAft>
-                <a:spcPts val="0"/>
-              </a:spcAft>
-              <a:buNone/>
-            </a:pPr>
-            <a:r>
-              <a:rPr lang="en-US" altLang="ko" sz="1200" b="1" i="0" u="none" strike="noStrike" cap="none" dirty="0">
-                <a:solidFill>
-                  <a:schemeClr val="bg1"/>
-                </a:solidFill>
-                <a:latin typeface="Arial"/>
-                <a:ea typeface="Arial"/>
-                <a:cs typeface="Arial"/>
-                <a:sym typeface="Arial"/>
-              </a:rPr>
-              <a:t>1</a:t>
-            </a:r>
-            <a:r>
-              <a:rPr lang="ko" sz="1200" b="1" i="0" u="none" strike="noStrike" cap="none" dirty="0">
-                <a:solidFill>
-                  <a:schemeClr val="bg1"/>
-                </a:solidFill>
-                <a:latin typeface="Arial"/>
-                <a:ea typeface="Arial"/>
-                <a:cs typeface="Arial"/>
-                <a:sym typeface="Arial"/>
-              </a:rPr>
-              <a:t>.</a:t>
-            </a:r>
-            <a:endParaRPr sz="500" dirty="0">
-              <a:solidFill>
-                <a:schemeClr val="bg1"/>
-              </a:solidFill>
-            </a:endParaRPr>
-          </a:p>
-        </p:txBody>
-      </p:sp>
-      <p:sp>
-        <p:nvSpPr>
-          <p:cNvPr id="8" name="Google Shape;210;p30">
-            <a:extLst>
-              <a:ext uri="{FF2B5EF4-FFF2-40B4-BE49-F238E27FC236}">
-                <a16:creationId xmlns:a16="http://schemas.microsoft.com/office/drawing/2014/main" id="{8CB63A74-B5C7-DCAA-53F5-96E44004D694}"/>
-              </a:ext>
-            </a:extLst>
-          </p:cNvPr>
-          <p:cNvSpPr/>
-          <p:nvPr/>
-        </p:nvSpPr>
-        <p:spPr>
-          <a:xfrm>
-            <a:off x="7811013" y="825047"/>
-            <a:ext cx="952500" cy="293400"/>
-          </a:xfrm>
-          <a:prstGeom prst="rect">
-            <a:avLst/>
-          </a:prstGeom>
-          <a:noFill/>
-          <a:ln>
-            <a:noFill/>
-          </a:ln>
-        </p:spPr>
-        <p:txBody>
-          <a:bodyPr spcFirstLastPara="1" wrap="square" lIns="19050" tIns="19050" rIns="19050" bIns="19050" anchor="t" anchorCtr="0">
-            <a:noAutofit/>
-          </a:bodyPr>
-          <a:lstStyle/>
-          <a:p>
-            <a:pPr marL="63500" marR="0" lvl="1" indent="0" algn="l" rtl="0">
-              <a:spcBef>
-                <a:spcPts val="200"/>
-              </a:spcBef>
-              <a:spcAft>
-                <a:spcPts val="0"/>
-              </a:spcAft>
-              <a:buClr>
-                <a:srgbClr val="000000"/>
-              </a:buClr>
-              <a:buFont typeface="Arial"/>
-              <a:buNone/>
-            </a:pPr>
-            <a:r>
-              <a:rPr lang="ko-KR" altLang="en-US" sz="800" dirty="0">
-                <a:solidFill>
-                  <a:schemeClr val="bg1"/>
-                </a:solidFill>
-              </a:rPr>
-              <a:t>소개 및 환경구성</a:t>
-            </a:r>
-            <a:endParaRPr sz="800" dirty="0">
-              <a:solidFill>
-                <a:schemeClr val="bg1"/>
-              </a:solidFill>
-            </a:endParaRPr>
-          </a:p>
-        </p:txBody>
-      </p:sp>
-      <p:sp>
-        <p:nvSpPr>
-          <p:cNvPr id="6" name="TextBox 5">
-            <a:extLst>
-              <a:ext uri="{FF2B5EF4-FFF2-40B4-BE49-F238E27FC236}">
-                <a16:creationId xmlns:a16="http://schemas.microsoft.com/office/drawing/2014/main" id="{A39D204B-5E6E-B41A-E4C9-3CF4ADB9FA39}"/>
-              </a:ext>
-            </a:extLst>
-          </p:cNvPr>
-          <p:cNvSpPr txBox="1"/>
-          <p:nvPr/>
-        </p:nvSpPr>
-        <p:spPr>
-          <a:xfrm>
-            <a:off x="4572000" y="2014406"/>
-            <a:ext cx="609462" cy="415498"/>
-          </a:xfrm>
-          <a:prstGeom prst="rect">
-            <a:avLst/>
-          </a:prstGeom>
-          <a:noFill/>
-        </p:spPr>
-        <p:txBody>
-          <a:bodyPr wrap="none" rtlCol="0">
-            <a:spAutoFit/>
-          </a:bodyPr>
-          <a:lstStyle/>
-          <a:p>
-            <a:r>
-              <a:rPr lang="en-US" altLang="ko-KR" sz="2100" dirty="0">
-                <a:latin typeface="Spoqa Han Sans Neo Medium" pitchFamily="2" charset="-127"/>
-                <a:ea typeface="Spoqa Han Sans Neo Medium" pitchFamily="2" charset="-127"/>
-              </a:rPr>
-              <a:t>API</a:t>
-            </a:r>
-            <a:endParaRPr lang="ko-KR" altLang="en-US" sz="2100" dirty="0">
-              <a:latin typeface="Spoqa Han Sans Neo Medium" pitchFamily="2" charset="-127"/>
-              <a:ea typeface="Spoqa Han Sans Neo Medium" pitchFamily="2" charset="-127"/>
-            </a:endParaRPr>
-          </a:p>
-        </p:txBody>
-      </p:sp>
-      <p:pic>
-        <p:nvPicPr>
-          <p:cNvPr id="10" name="그림 9">
-            <a:extLst>
-              <a:ext uri="{FF2B5EF4-FFF2-40B4-BE49-F238E27FC236}">
-                <a16:creationId xmlns:a16="http://schemas.microsoft.com/office/drawing/2014/main" id="{F89081F6-7C1F-033F-70EB-FE9BF669F526}"/>
-              </a:ext>
-            </a:extLst>
-          </p:cNvPr>
-          <p:cNvPicPr>
-            <a:picLocks noChangeAspect="1"/>
-          </p:cNvPicPr>
-          <p:nvPr/>
-        </p:nvPicPr>
-        <p:blipFill>
-          <a:blip r:embed="rId3"/>
-          <a:stretch>
-            <a:fillRect/>
-          </a:stretch>
-        </p:blipFill>
-        <p:spPr>
-          <a:xfrm>
-            <a:off x="4401063" y="2423854"/>
-            <a:ext cx="4249311" cy="2522318"/>
-          </a:xfrm>
-          <a:prstGeom prst="rect">
-            <a:avLst/>
-          </a:prstGeom>
-        </p:spPr>
-      </p:pic>
-      <p:pic>
-        <p:nvPicPr>
-          <p:cNvPr id="12" name="그림 11">
-            <a:extLst>
-              <a:ext uri="{FF2B5EF4-FFF2-40B4-BE49-F238E27FC236}">
-                <a16:creationId xmlns:a16="http://schemas.microsoft.com/office/drawing/2014/main" id="{2FBE5B6E-1A60-94D9-187F-913C139920B9}"/>
-              </a:ext>
-            </a:extLst>
-          </p:cNvPr>
-          <p:cNvPicPr>
-            <a:picLocks noChangeAspect="1"/>
-          </p:cNvPicPr>
-          <p:nvPr/>
-        </p:nvPicPr>
-        <p:blipFill>
-          <a:blip r:embed="rId4"/>
-          <a:stretch>
-            <a:fillRect/>
-          </a:stretch>
-        </p:blipFill>
-        <p:spPr>
-          <a:xfrm>
-            <a:off x="802803" y="2423854"/>
-            <a:ext cx="3313233" cy="2522318"/>
-          </a:xfrm>
-          <a:prstGeom prst="rect">
-            <a:avLst/>
-          </a:prstGeom>
-        </p:spPr>
-      </p:pic>
-      <p:sp>
-        <p:nvSpPr>
-          <p:cNvPr id="13" name="TextBox 12">
-            <a:extLst>
-              <a:ext uri="{FF2B5EF4-FFF2-40B4-BE49-F238E27FC236}">
-                <a16:creationId xmlns:a16="http://schemas.microsoft.com/office/drawing/2014/main" id="{C1D81F25-AA1B-5D79-2481-6935028480F3}"/>
-              </a:ext>
-            </a:extLst>
-          </p:cNvPr>
-          <p:cNvSpPr txBox="1"/>
-          <p:nvPr/>
-        </p:nvSpPr>
-        <p:spPr>
-          <a:xfrm>
-            <a:off x="831495" y="1981792"/>
-            <a:ext cx="1178528" cy="415498"/>
-          </a:xfrm>
-          <a:prstGeom prst="rect">
-            <a:avLst/>
-          </a:prstGeom>
-          <a:noFill/>
-        </p:spPr>
-        <p:txBody>
-          <a:bodyPr wrap="none" rtlCol="0">
-            <a:spAutoFit/>
-          </a:bodyPr>
-          <a:lstStyle/>
-          <a:p>
-            <a:r>
-              <a:rPr lang="ko-KR" altLang="en-US" sz="2100" dirty="0">
-                <a:latin typeface="Spoqa Han Sans Neo Medium" pitchFamily="2" charset="-127"/>
-                <a:ea typeface="Spoqa Han Sans Neo Medium" pitchFamily="2" charset="-127"/>
-              </a:rPr>
-              <a:t>자료구조</a:t>
-            </a:r>
+              <a:rPr lang="en-US" altLang="ko-KR" dirty="0"/>
+              <a:t>Hello Reactor</a:t>
+            </a:r>
+            <a:endParaRPr lang="ko-KR" altLang="en-US" dirty="0"/>
           </a:p>
         </p:txBody>
       </p:sp>
     </p:spTree>
     <p:extLst>
       <p:ext uri="{BB962C8B-B14F-4D97-AF65-F5344CB8AC3E}">
-        <p14:creationId xmlns:p14="http://schemas.microsoft.com/office/powerpoint/2010/main" val="824592560"/>
+        <p14:creationId xmlns:p14="http://schemas.microsoft.com/office/powerpoint/2010/main" val="3012872894"/>
       </p:ext>
     </p:extLst>
   </p:cSld>

</xml_diff>